<commit_message>
Updated content in react ppt
</commit_message>
<xml_diff>
--- a/react/study_materials/React.pptx
+++ b/react/study_materials/React.pptx
@@ -17,13 +17,15 @@
     <p:sldId id="266" r:id="rId11"/>
     <p:sldId id="267" r:id="rId12"/>
     <p:sldId id="268" r:id="rId13"/>
-    <p:sldId id="269" r:id="rId14"/>
-    <p:sldId id="270" r:id="rId15"/>
-    <p:sldId id="271" r:id="rId16"/>
-    <p:sldId id="272" r:id="rId17"/>
-    <p:sldId id="273" r:id="rId18"/>
-    <p:sldId id="274" r:id="rId19"/>
-    <p:sldId id="275" r:id="rId20"/>
+    <p:sldId id="276" r:id="rId14"/>
+    <p:sldId id="269" r:id="rId15"/>
+    <p:sldId id="277" r:id="rId16"/>
+    <p:sldId id="270" r:id="rId17"/>
+    <p:sldId id="271" r:id="rId18"/>
+    <p:sldId id="272" r:id="rId19"/>
+    <p:sldId id="273" r:id="rId20"/>
+    <p:sldId id="274" r:id="rId21"/>
+    <p:sldId id="275" r:id="rId22"/>
   </p:sldIdLst>
   <p:sldSz cx="12192000" cy="6858000"/>
   <p:notesSz cx="6858000" cy="9144000"/>
@@ -133,6 +135,7 @@
 <file path=ppt/revisionInfo.xml><?xml version="1.0" encoding="utf-8"?>
 <p1510:revInfo xmlns:a="http://schemas.openxmlformats.org/drawingml/2006/main" xmlns:r="http://schemas.openxmlformats.org/officeDocument/2006/relationships" xmlns:p1510="http://schemas.microsoft.com/office/powerpoint/2015/10/main">
   <p1510:revLst>
+    <p1510:client id="{22ABDAFC-7C43-42EF-B8FA-22C02C265143}" v="178" dt="2023-11-06T16:28:16.470"/>
     <p1510:client id="{55428BC7-990C-4BC1-8B64-3DA6EB586F36}" v="540" dt="2023-11-05T16:58:34.041"/>
     <p1510:client id="{6BD5CC1B-2CFC-4CC5-88E8-F9DE27E94B28}" v="305" dt="2023-11-06T15:50:18.124"/>
   </p1510:revLst>
@@ -1739,6 +1742,148 @@
           <ac:cxnSpMkLst>
             <pc:docMk/>
             <pc:sldMk cId="1373347020" sldId="267"/>
+            <ac:cxnSpMk id="12" creationId="{4AD7FFC6-42A9-49CB-B5E9-B3F6B038331B}"/>
+          </ac:cxnSpMkLst>
+        </pc:cxnChg>
+      </pc:sldChg>
+    </pc:docChg>
+  </pc:docChgLst>
+  <pc:docChgLst>
+    <pc:chgData name="Siva Prasanna S" userId="S::sivaprasanna.s@iamneo.ai::3f99ddd6-8f78-41d3-b6e2-fa1d0164a322" providerId="AD" clId="Web-{22ABDAFC-7C43-42EF-B8FA-22C02C265143}"/>
+    <pc:docChg chg="addSld delSld modSld">
+      <pc:chgData name="Siva Prasanna S" userId="S::sivaprasanna.s@iamneo.ai::3f99ddd6-8f78-41d3-b6e2-fa1d0164a322" providerId="AD" clId="Web-{22ABDAFC-7C43-42EF-B8FA-22C02C265143}" dt="2023-11-06T16:28:16.470" v="156" actId="20577"/>
+      <pc:docMkLst>
+        <pc:docMk/>
+      </pc:docMkLst>
+      <pc:sldChg chg="modSp add replId">
+        <pc:chgData name="Siva Prasanna S" userId="S::sivaprasanna.s@iamneo.ai::3f99ddd6-8f78-41d3-b6e2-fa1d0164a322" providerId="AD" clId="Web-{22ABDAFC-7C43-42EF-B8FA-22C02C265143}" dt="2023-11-06T16:14:05.443" v="38" actId="20577"/>
+        <pc:sldMkLst>
+          <pc:docMk/>
+          <pc:sldMk cId="1486928099" sldId="276"/>
+        </pc:sldMkLst>
+        <pc:spChg chg="mod">
+          <ac:chgData name="Siva Prasanna S" userId="S::sivaprasanna.s@iamneo.ai::3f99ddd6-8f78-41d3-b6e2-fa1d0164a322" providerId="AD" clId="Web-{22ABDAFC-7C43-42EF-B8FA-22C02C265143}" dt="2023-11-06T16:13:06.442" v="35" actId="20577"/>
+          <ac:spMkLst>
+            <pc:docMk/>
+            <pc:sldMk cId="1486928099" sldId="276"/>
+            <ac:spMk id="2" creationId="{0833764A-6054-E198-9B9B-D9EBC1F4D245}"/>
+          </ac:spMkLst>
+        </pc:spChg>
+        <pc:spChg chg="mod">
+          <ac:chgData name="Siva Prasanna S" userId="S::sivaprasanna.s@iamneo.ai::3f99ddd6-8f78-41d3-b6e2-fa1d0164a322" providerId="AD" clId="Web-{22ABDAFC-7C43-42EF-B8FA-22C02C265143}" dt="2023-11-06T16:14:05.443" v="38" actId="20577"/>
+          <ac:spMkLst>
+            <pc:docMk/>
+            <pc:sldMk cId="1486928099" sldId="276"/>
+            <ac:spMk id="3" creationId="{BF6387C6-3A3A-ED00-D649-6CCE37F720FD}"/>
+          </ac:spMkLst>
+        </pc:spChg>
+      </pc:sldChg>
+      <pc:sldChg chg="modSp add replId">
+        <pc:chgData name="Siva Prasanna S" userId="S::sivaprasanna.s@iamneo.ai::3f99ddd6-8f78-41d3-b6e2-fa1d0164a322" providerId="AD" clId="Web-{22ABDAFC-7C43-42EF-B8FA-22C02C265143}" dt="2023-11-06T16:28:16.470" v="156" actId="20577"/>
+        <pc:sldMkLst>
+          <pc:docMk/>
+          <pc:sldMk cId="2393684056" sldId="277"/>
+        </pc:sldMkLst>
+        <pc:spChg chg="mod">
+          <ac:chgData name="Siva Prasanna S" userId="S::sivaprasanna.s@iamneo.ai::3f99ddd6-8f78-41d3-b6e2-fa1d0164a322" providerId="AD" clId="Web-{22ABDAFC-7C43-42EF-B8FA-22C02C265143}" dt="2023-11-06T16:14:26.147" v="43" actId="20577"/>
+          <ac:spMkLst>
+            <pc:docMk/>
+            <pc:sldMk cId="2393684056" sldId="277"/>
+            <ac:spMk id="2" creationId="{0833764A-6054-E198-9B9B-D9EBC1F4D245}"/>
+          </ac:spMkLst>
+        </pc:spChg>
+        <pc:spChg chg="mod">
+          <ac:chgData name="Siva Prasanna S" userId="S::sivaprasanna.s@iamneo.ai::3f99ddd6-8f78-41d3-b6e2-fa1d0164a322" providerId="AD" clId="Web-{22ABDAFC-7C43-42EF-B8FA-22C02C265143}" dt="2023-11-06T16:28:16.470" v="156" actId="20577"/>
+          <ac:spMkLst>
+            <pc:docMk/>
+            <pc:sldMk cId="2393684056" sldId="277"/>
+            <ac:spMk id="3" creationId="{BF6387C6-3A3A-ED00-D649-6CCE37F720FD}"/>
+          </ac:spMkLst>
+        </pc:spChg>
+      </pc:sldChg>
+      <pc:sldChg chg="addSp delSp modSp add del replId">
+        <pc:chgData name="Siva Prasanna S" userId="S::sivaprasanna.s@iamneo.ai::3f99ddd6-8f78-41d3-b6e2-fa1d0164a322" providerId="AD" clId="Web-{22ABDAFC-7C43-42EF-B8FA-22C02C265143}" dt="2023-11-06T16:21:12.925" v="155"/>
+        <pc:sldMkLst>
+          <pc:docMk/>
+          <pc:sldMk cId="2279585627" sldId="278"/>
+        </pc:sldMkLst>
+        <pc:spChg chg="mod">
+          <ac:chgData name="Siva Prasanna S" userId="S::sivaprasanna.s@iamneo.ai::3f99ddd6-8f78-41d3-b6e2-fa1d0164a322" providerId="AD" clId="Web-{22ABDAFC-7C43-42EF-B8FA-22C02C265143}" dt="2023-11-06T16:17:52.153" v="131"/>
+          <ac:spMkLst>
+            <pc:docMk/>
+            <pc:sldMk cId="2279585627" sldId="278"/>
+            <ac:spMk id="2" creationId="{0833764A-6054-E198-9B9B-D9EBC1F4D245}"/>
+          </ac:spMkLst>
+        </pc:spChg>
+        <pc:spChg chg="mod">
+          <ac:chgData name="Siva Prasanna S" userId="S::sivaprasanna.s@iamneo.ai::3f99ddd6-8f78-41d3-b6e2-fa1d0164a322" providerId="AD" clId="Web-{22ABDAFC-7C43-42EF-B8FA-22C02C265143}" dt="2023-11-06T16:20:58.300" v="154" actId="20577"/>
+          <ac:spMkLst>
+            <pc:docMk/>
+            <pc:sldMk cId="2279585627" sldId="278"/>
+            <ac:spMk id="3" creationId="{BF6387C6-3A3A-ED00-D649-6CCE37F720FD}"/>
+          </ac:spMkLst>
+        </pc:spChg>
+        <pc:spChg chg="add del">
+          <ac:chgData name="Siva Prasanna S" userId="S::sivaprasanna.s@iamneo.ai::3f99ddd6-8f78-41d3-b6e2-fa1d0164a322" providerId="AD" clId="Web-{22ABDAFC-7C43-42EF-B8FA-22C02C265143}" dt="2023-11-06T16:17:52.153" v="131"/>
+          <ac:spMkLst>
+            <pc:docMk/>
+            <pc:sldMk cId="2279585627" sldId="278"/>
+            <ac:spMk id="8" creationId="{E8A8EAB8-D2FF-444D-B34B-7D32F106AD0E}"/>
+          </ac:spMkLst>
+        </pc:spChg>
+        <pc:spChg chg="add del">
+          <ac:chgData name="Siva Prasanna S" userId="S::sivaprasanna.s@iamneo.ai::3f99ddd6-8f78-41d3-b6e2-fa1d0164a322" providerId="AD" clId="Web-{22ABDAFC-7C43-42EF-B8FA-22C02C265143}" dt="2023-11-06T16:17:52.153" v="131"/>
+          <ac:spMkLst>
+            <pc:docMk/>
+            <pc:sldMk cId="2279585627" sldId="278"/>
+            <ac:spMk id="17" creationId="{57AA3065-908F-4990-AE53-A40A58D208D7}"/>
+          </ac:spMkLst>
+        </pc:spChg>
+        <pc:spChg chg="add del">
+          <ac:chgData name="Siva Prasanna S" userId="S::sivaprasanna.s@iamneo.ai::3f99ddd6-8f78-41d3-b6e2-fa1d0164a322" providerId="AD" clId="Web-{22ABDAFC-7C43-42EF-B8FA-22C02C265143}" dt="2023-11-06T16:17:52.153" v="131"/>
+          <ac:spMkLst>
+            <pc:docMk/>
+            <pc:sldMk cId="2279585627" sldId="278"/>
+            <ac:spMk id="19" creationId="{5B7778FC-632E-4DCA-A7CB-0D7731CCF970}"/>
+          </ac:spMkLst>
+        </pc:spChg>
+        <pc:spChg chg="add del">
+          <ac:chgData name="Siva Prasanna S" userId="S::sivaprasanna.s@iamneo.ai::3f99ddd6-8f78-41d3-b6e2-fa1d0164a322" providerId="AD" clId="Web-{22ABDAFC-7C43-42EF-B8FA-22C02C265143}" dt="2023-11-06T16:17:52.153" v="131"/>
+          <ac:spMkLst>
+            <pc:docMk/>
+            <pc:sldMk cId="2279585627" sldId="278"/>
+            <ac:spMk id="21" creationId="{B10BB131-AC8E-4A8E-A5D1-36260F720C3B}"/>
+          </ac:spMkLst>
+        </pc:spChg>
+        <pc:spChg chg="add del">
+          <ac:chgData name="Siva Prasanna S" userId="S::sivaprasanna.s@iamneo.ai::3f99ddd6-8f78-41d3-b6e2-fa1d0164a322" providerId="AD" clId="Web-{22ABDAFC-7C43-42EF-B8FA-22C02C265143}" dt="2023-11-06T16:17:52.153" v="131"/>
+          <ac:spMkLst>
+            <pc:docMk/>
+            <pc:sldMk cId="2279585627" sldId="278"/>
+            <ac:spMk id="23" creationId="{FA23A907-97FB-4A8F-880A-DD77401C4296}"/>
+          </ac:spMkLst>
+        </pc:spChg>
+        <pc:picChg chg="mod ord">
+          <ac:chgData name="Siva Prasanna S" userId="S::sivaprasanna.s@iamneo.ai::3f99ddd6-8f78-41d3-b6e2-fa1d0164a322" providerId="AD" clId="Web-{22ABDAFC-7C43-42EF-B8FA-22C02C265143}" dt="2023-11-06T16:17:52.153" v="131"/>
+          <ac:picMkLst>
+            <pc:docMk/>
+            <pc:sldMk cId="2279585627" sldId="278"/>
+            <ac:picMk id="6" creationId="{613F53E4-F588-E339-4238-FD6621D61BA8}"/>
+          </ac:picMkLst>
+        </pc:picChg>
+        <pc:cxnChg chg="add del">
+          <ac:chgData name="Siva Prasanna S" userId="S::sivaprasanna.s@iamneo.ai::3f99ddd6-8f78-41d3-b6e2-fa1d0164a322" providerId="AD" clId="Web-{22ABDAFC-7C43-42EF-B8FA-22C02C265143}" dt="2023-11-06T16:17:52.153" v="131"/>
+          <ac:cxnSpMkLst>
+            <pc:docMk/>
+            <pc:sldMk cId="2279585627" sldId="278"/>
+            <ac:cxnSpMk id="10" creationId="{067633D1-6EE6-4118-B9F0-B363477BEE7A}"/>
+          </ac:cxnSpMkLst>
+        </pc:cxnChg>
+        <pc:cxnChg chg="add del">
+          <ac:chgData name="Siva Prasanna S" userId="S::sivaprasanna.s@iamneo.ai::3f99ddd6-8f78-41d3-b6e2-fa1d0164a322" providerId="AD" clId="Web-{22ABDAFC-7C43-42EF-B8FA-22C02C265143}" dt="2023-11-06T16:17:52.153" v="131"/>
+          <ac:cxnSpMkLst>
+            <pc:docMk/>
+            <pc:sldMk cId="2279585627" sldId="278"/>
             <ac:cxnSpMk id="12" creationId="{4AD7FFC6-42A9-49CB-B5E9-B3F6B038331B}"/>
           </ac:cxnSpMkLst>
         </pc:cxnChg>
@@ -6648,12 +6793,15 @@
             <a:r>
               <a:rPr lang="en-GB" sz="8000" dirty="0">
                 <a:solidFill>
-                  <a:schemeClr val="bg1"/>
-                </a:solidFill>
+                  <a:srgbClr val="FFFFFF"/>
+                </a:solidFill>
+                <a:latin typeface="Calibri Light"/>
+                <a:ea typeface="Calibri Light"/>
                 <a:cs typeface="Calibri Light"/>
               </a:rPr>
-              <a:t>Babel</a:t>
-            </a:r>
+              <a:t>Install Webpack</a:t>
+            </a:r>
+            <a:endParaRPr lang="en-US" dirty="0"/>
           </a:p>
         </p:txBody>
       </p:sp>
@@ -6779,6 +6927,483 @@
         </p:nvSpPr>
         <p:spPr>
           <a:xfrm>
+            <a:off x="5241564" y="1853001"/>
+            <a:ext cx="6581538" cy="4571972"/>
+          </a:xfrm>
+        </p:spPr>
+        <p:txBody>
+          <a:bodyPr vert="horz" lIns="91440" tIns="45720" rIns="91440" bIns="45720" rtlCol="0" anchor="ctr">
+            <a:normAutofit/>
+          </a:bodyPr>
+          <a:lstStyle/>
+          <a:p>
+            <a:pPr marL="0" indent="0">
+              <a:buNone/>
+            </a:pPr>
+            <a:r>
+              <a:rPr lang="en-GB" sz="2000" dirty="0">
+                <a:solidFill>
+                  <a:srgbClr val="D1D5DB"/>
+                </a:solidFill>
+                <a:latin typeface="Arial"/>
+                <a:ea typeface="+mn-lt"/>
+                <a:cs typeface="+mn-lt"/>
+              </a:rPr>
+              <a:t>Install Webpack and necessary loaders and plugins:</a:t>
+            </a:r>
+          </a:p>
+          <a:p>
+            <a:pPr marL="342900" indent="-342900">
+              <a:buAutoNum type="arabicPeriod"/>
+            </a:pPr>
+            <a:r>
+              <a:rPr lang="en-GB" sz="2000" err="1">
+                <a:solidFill>
+                  <a:srgbClr val="D1D5DB"/>
+                </a:solidFill>
+                <a:latin typeface="Arial"/>
+                <a:ea typeface="+mn-lt"/>
+                <a:cs typeface="Arial"/>
+              </a:rPr>
+              <a:t>npm</a:t>
+            </a:r>
+            <a:r>
+              <a:rPr lang="en-GB" sz="2000" dirty="0">
+                <a:solidFill>
+                  <a:srgbClr val="D1D5DB"/>
+                </a:solidFill>
+                <a:latin typeface="Arial"/>
+                <a:ea typeface="+mn-lt"/>
+                <a:cs typeface="Arial"/>
+              </a:rPr>
+              <a:t> install --save-dev webpack webpack-cli </a:t>
+            </a:r>
+            <a:r>
+              <a:rPr lang="en-GB" sz="2000">
+                <a:solidFill>
+                  <a:srgbClr val="D1D5DB"/>
+                </a:solidFill>
+                <a:latin typeface="Arial"/>
+                <a:ea typeface="+mn-lt"/>
+                <a:cs typeface="Arial"/>
+              </a:rPr>
+              <a:t>webpack-dev-server</a:t>
+            </a:r>
+            <a:r>
+              <a:rPr lang="en-GB" sz="2000" dirty="0">
+                <a:solidFill>
+                  <a:srgbClr val="D1D5DB"/>
+                </a:solidFill>
+                <a:latin typeface="Arial"/>
+                <a:ea typeface="+mn-lt"/>
+                <a:cs typeface="Arial"/>
+              </a:rPr>
+              <a:t> html-webpack-plugin</a:t>
+            </a:r>
+            <a:endParaRPr lang="en-GB" sz="2000">
+              <a:latin typeface="Arial"/>
+              <a:ea typeface="Calibri" panose="020F0502020204030204"/>
+              <a:cs typeface="Calibri" panose="020F0502020204030204"/>
+            </a:endParaRPr>
+          </a:p>
+          <a:p>
+            <a:pPr marL="342900" indent="-342900">
+              <a:buAutoNum type="arabicPeriod"/>
+            </a:pPr>
+            <a:r>
+              <a:rPr lang="en-GB" sz="2000" dirty="0" err="1">
+                <a:solidFill>
+                  <a:srgbClr val="D1D5DB"/>
+                </a:solidFill>
+                <a:latin typeface="Arial"/>
+                <a:ea typeface="+mn-lt"/>
+                <a:cs typeface="+mn-lt"/>
+              </a:rPr>
+              <a:t>npm</a:t>
+            </a:r>
+            <a:r>
+              <a:rPr lang="en-GB" sz="2000" dirty="0">
+                <a:solidFill>
+                  <a:srgbClr val="D1D5DB"/>
+                </a:solidFill>
+                <a:latin typeface="Arial"/>
+                <a:ea typeface="+mn-lt"/>
+                <a:cs typeface="+mn-lt"/>
+              </a:rPr>
+              <a:t> install --save-dev style-loader </a:t>
+            </a:r>
+            <a:r>
+              <a:rPr lang="en-GB" sz="2000" dirty="0" err="1">
+                <a:solidFill>
+                  <a:srgbClr val="D1D5DB"/>
+                </a:solidFill>
+                <a:latin typeface="Arial"/>
+                <a:ea typeface="+mn-lt"/>
+                <a:cs typeface="+mn-lt"/>
+              </a:rPr>
+              <a:t>css</a:t>
+            </a:r>
+            <a:r>
+              <a:rPr lang="en-GB" sz="2000" dirty="0">
+                <a:solidFill>
+                  <a:srgbClr val="D1D5DB"/>
+                </a:solidFill>
+                <a:latin typeface="Arial"/>
+                <a:ea typeface="+mn-lt"/>
+                <a:cs typeface="+mn-lt"/>
+              </a:rPr>
+              <a:t>-loader file-loader</a:t>
+            </a:r>
+            <a:endParaRPr lang="en-GB" sz="2000" dirty="0">
+              <a:solidFill>
+                <a:srgbClr val="D1D5DB"/>
+              </a:solidFill>
+              <a:latin typeface="Arial"/>
+              <a:ea typeface="Calibri"/>
+              <a:cs typeface="Arial"/>
+            </a:endParaRPr>
+          </a:p>
+          <a:p>
+            <a:pPr marL="342900" indent="-342900">
+              <a:buAutoNum type="arabicPeriod"/>
+            </a:pPr>
+            <a:endParaRPr lang="en-GB" sz="2000" dirty="0">
+              <a:solidFill>
+                <a:srgbClr val="D1D5DB"/>
+              </a:solidFill>
+              <a:latin typeface="Arial"/>
+              <a:ea typeface="Calibri"/>
+              <a:cs typeface="Arial"/>
+            </a:endParaRPr>
+          </a:p>
+          <a:p>
+            <a:pPr marL="342900" indent="-342900">
+              <a:buAutoNum type="arabicPeriod"/>
+            </a:pPr>
+            <a:endParaRPr lang="en-GB" sz="2000" dirty="0">
+              <a:solidFill>
+                <a:srgbClr val="D1D5DB"/>
+              </a:solidFill>
+              <a:latin typeface="Arial"/>
+              <a:ea typeface="Calibri"/>
+              <a:cs typeface="Arial"/>
+            </a:endParaRPr>
+          </a:p>
+          <a:p>
+            <a:pPr marL="0" indent="0">
+              <a:buNone/>
+            </a:pPr>
+            <a:endParaRPr lang="en-GB" sz="2000" dirty="0">
+              <a:solidFill>
+                <a:srgbClr val="D1D5DB"/>
+              </a:solidFill>
+              <a:latin typeface="Arial"/>
+              <a:ea typeface="Calibri"/>
+              <a:cs typeface="Calibri"/>
+            </a:endParaRPr>
+          </a:p>
+        </p:txBody>
+      </p:sp>
+      <p:pic>
+        <p:nvPicPr>
+          <p:cNvPr id="6" name="Picture 5" descr="A couple of yellow cartoon characters&#10;&#10;Description automatically generated">
+            <a:extLst>
+              <a:ext uri="{FF2B5EF4-FFF2-40B4-BE49-F238E27FC236}">
+                <a16:creationId xmlns:a16="http://schemas.microsoft.com/office/drawing/2014/main" id="{613F53E4-F588-E339-4238-FD6621D61BA8}"/>
+              </a:ext>
+            </a:extLst>
+          </p:cNvPr>
+          <p:cNvPicPr>
+            <a:picLocks noChangeAspect="1"/>
+          </p:cNvPicPr>
+          <p:nvPr/>
+        </p:nvPicPr>
+        <p:blipFill>
+          <a:blip r:embed="rId2"/>
+          <a:stretch>
+            <a:fillRect/>
+          </a:stretch>
+        </p:blipFill>
+        <p:spPr>
+          <a:xfrm>
+            <a:off x="9380294" y="5041490"/>
+            <a:ext cx="3425735" cy="1751976"/>
+          </a:xfrm>
+          <a:prstGeom prst="rect">
+            <a:avLst/>
+          </a:prstGeom>
+        </p:spPr>
+      </p:pic>
+    </p:spTree>
+    <p:extLst>
+      <p:ext uri="{BB962C8B-B14F-4D97-AF65-F5344CB8AC3E}">
+        <p14:creationId xmlns:p14="http://schemas.microsoft.com/office/powerpoint/2010/main" val="1486928099"/>
+      </p:ext>
+    </p:extLst>
+  </p:cSld>
+  <p:clrMapOvr>
+    <a:masterClrMapping/>
+  </p:clrMapOvr>
+</p:sld>
+</file>
+
+<file path=ppt/slides/slide14.xml><?xml version="1.0" encoding="utf-8"?>
+<p:sld xmlns:a="http://schemas.openxmlformats.org/drawingml/2006/main" xmlns:r="http://schemas.openxmlformats.org/officeDocument/2006/relationships" xmlns:p="http://schemas.openxmlformats.org/presentationml/2006/main">
+  <p:cSld>
+    <p:bg>
+      <p:bgPr>
+        <a:solidFill>
+          <a:schemeClr val="bg1"/>
+        </a:solidFill>
+        <a:effectLst/>
+      </p:bgPr>
+    </p:bg>
+    <p:spTree>
+      <p:nvGrpSpPr>
+        <p:cNvPr id="1" name=""/>
+        <p:cNvGrpSpPr/>
+        <p:nvPr/>
+      </p:nvGrpSpPr>
+      <p:grpSpPr>
+        <a:xfrm>
+          <a:off x="0" y="0"/>
+          <a:ext cx="0" cy="0"/>
+          <a:chOff x="0" y="0"/>
+          <a:chExt cx="0" cy="0"/>
+        </a:xfrm>
+      </p:grpSpPr>
+      <p:sp>
+        <p:nvSpPr>
+          <p:cNvPr id="8" name="Rectangle 7">
+            <a:extLst>
+              <a:ext uri="{FF2B5EF4-FFF2-40B4-BE49-F238E27FC236}">
+                <a16:creationId xmlns:a16="http://schemas.microsoft.com/office/drawing/2014/main" id="{E8A8EAB8-D2FF-444D-B34B-7D32F106AD0E}"/>
+              </a:ext>
+              <a:ext uri="{C183D7F6-B498-43B3-948B-1728B52AA6E4}">
+                <adec:decorative xmlns:adec="http://schemas.microsoft.com/office/drawing/2017/decorative" val="1"/>
+              </a:ext>
+            </a:extLst>
+          </p:cNvPr>
+          <p:cNvSpPr>
+            <a:spLocks noGrp="1" noRot="1" noChangeAspect="1" noMove="1" noResize="1" noEditPoints="1" noAdjustHandles="1" noChangeArrowheads="1" noChangeShapeType="1" noTextEdit="1"/>
+          </p:cNvSpPr>
+          <p:nvPr>
+            <p:extLst>
+              <p:ext uri="{386F3935-93C4-4BCD-93E2-E3B085C9AB24}">
+                <p16:designElem xmlns:p16="http://schemas.microsoft.com/office/powerpoint/2015/main" val="1"/>
+              </p:ext>
+            </p:extLst>
+          </p:nvPr>
+        </p:nvSpPr>
+        <p:spPr>
+          <a:xfrm>
+            <a:off x="0" y="0"/>
+            <a:ext cx="12192000" cy="6858000"/>
+          </a:xfrm>
+          <a:prstGeom prst="rect">
+            <a:avLst/>
+          </a:prstGeom>
+          <a:solidFill>
+            <a:schemeClr val="tx1">
+              <a:lumMod val="95000"/>
+              <a:lumOff val="5000"/>
+            </a:schemeClr>
+          </a:solidFill>
+          <a:ln>
+            <a:noFill/>
+          </a:ln>
+        </p:spPr>
+        <p:style>
+          <a:lnRef idx="2">
+            <a:schemeClr val="accent1">
+              <a:shade val="50000"/>
+            </a:schemeClr>
+          </a:lnRef>
+          <a:fillRef idx="1">
+            <a:schemeClr val="accent1"/>
+          </a:fillRef>
+          <a:effectRef idx="0">
+            <a:schemeClr val="accent1"/>
+          </a:effectRef>
+          <a:fontRef idx="minor">
+            <a:schemeClr val="lt1"/>
+          </a:fontRef>
+        </p:style>
+        <p:txBody>
+          <a:bodyPr rtlCol="0" anchor="ctr"/>
+          <a:lstStyle/>
+          <a:p>
+            <a:pPr algn="ctr"/>
+            <a:endParaRPr lang="en-US" dirty="0">
+              <a:solidFill>
+                <a:schemeClr val="bg1"/>
+              </a:solidFill>
+            </a:endParaRPr>
+          </a:p>
+        </p:txBody>
+      </p:sp>
+      <p:sp>
+        <p:nvSpPr>
+          <p:cNvPr id="2" name="Title 1">
+            <a:extLst>
+              <a:ext uri="{FF2B5EF4-FFF2-40B4-BE49-F238E27FC236}">
+                <a16:creationId xmlns:a16="http://schemas.microsoft.com/office/drawing/2014/main" id="{0833764A-6054-E198-9B9B-D9EBC1F4D245}"/>
+              </a:ext>
+            </a:extLst>
+          </p:cNvPr>
+          <p:cNvSpPr>
+            <a:spLocks noGrp="1"/>
+          </p:cNvSpPr>
+          <p:nvPr>
+            <p:ph type="title"/>
+          </p:nvPr>
+        </p:nvSpPr>
+        <p:spPr>
+          <a:xfrm>
+            <a:off x="852014" y="1491187"/>
+            <a:ext cx="4515689" cy="3916159"/>
+          </a:xfrm>
+        </p:spPr>
+        <p:txBody>
+          <a:bodyPr anchor="ctr">
+            <a:normAutofit/>
+          </a:bodyPr>
+          <a:lstStyle/>
+          <a:p>
+            <a:r>
+              <a:rPr lang="en-GB" sz="8000" dirty="0">
+                <a:solidFill>
+                  <a:schemeClr val="bg1"/>
+                </a:solidFill>
+                <a:cs typeface="Calibri Light"/>
+              </a:rPr>
+              <a:t>Babel</a:t>
+            </a:r>
+          </a:p>
+        </p:txBody>
+      </p:sp>
+      <p:cxnSp>
+        <p:nvCxnSpPr>
+          <p:cNvPr id="10" name="Straight Connector 9">
+            <a:extLst>
+              <a:ext uri="{FF2B5EF4-FFF2-40B4-BE49-F238E27FC236}">
+                <a16:creationId xmlns:a16="http://schemas.microsoft.com/office/drawing/2014/main" id="{067633D1-6EE6-4118-B9F0-B363477BEE7A}"/>
+              </a:ext>
+              <a:ext uri="{C183D7F6-B498-43B3-948B-1728B52AA6E4}">
+                <adec:decorative xmlns:adec="http://schemas.microsoft.com/office/drawing/2017/decorative" val="1"/>
+              </a:ext>
+            </a:extLst>
+          </p:cNvPr>
+          <p:cNvCxnSpPr>
+            <a:cxnSpLocks noGrp="1" noRot="1" noChangeAspect="1" noMove="1" noResize="1" noEditPoints="1" noAdjustHandles="1" noChangeArrowheads="1" noChangeShapeType="1"/>
+          </p:cNvCxnSpPr>
+          <p:nvPr>
+            <p:extLst>
+              <p:ext uri="{386F3935-93C4-4BCD-93E2-E3B085C9AB24}">
+                <p16:designElem xmlns:p16="http://schemas.microsoft.com/office/powerpoint/2015/main" val="1"/>
+              </p:ext>
+            </p:extLst>
+          </p:nvPr>
+        </p:nvCxnSpPr>
+        <p:spPr>
+          <a:xfrm flipH="1">
+            <a:off x="1014141" y="1450655"/>
+            <a:ext cx="3932030" cy="0"/>
+          </a:xfrm>
+          <a:prstGeom prst="line">
+            <a:avLst/>
+          </a:prstGeom>
+          <a:ln w="12700">
+            <a:solidFill>
+              <a:schemeClr val="accent2"/>
+            </a:solidFill>
+          </a:ln>
+        </p:spPr>
+        <p:style>
+          <a:lnRef idx="1">
+            <a:schemeClr val="accent1"/>
+          </a:lnRef>
+          <a:fillRef idx="0">
+            <a:schemeClr val="accent1"/>
+          </a:fillRef>
+          <a:effectRef idx="0">
+            <a:schemeClr val="accent1"/>
+          </a:effectRef>
+          <a:fontRef idx="minor">
+            <a:schemeClr val="tx1"/>
+          </a:fontRef>
+        </p:style>
+      </p:cxnSp>
+      <p:cxnSp>
+        <p:nvCxnSpPr>
+          <p:cNvPr id="12" name="Straight Connector 11">
+            <a:extLst>
+              <a:ext uri="{FF2B5EF4-FFF2-40B4-BE49-F238E27FC236}">
+                <a16:creationId xmlns:a16="http://schemas.microsoft.com/office/drawing/2014/main" id="{4AD7FFC6-42A9-49CB-B5E9-B3F6B038331B}"/>
+              </a:ext>
+              <a:ext uri="{C183D7F6-B498-43B3-948B-1728B52AA6E4}">
+                <adec:decorative xmlns:adec="http://schemas.microsoft.com/office/drawing/2017/decorative" val="1"/>
+              </a:ext>
+            </a:extLst>
+          </p:cNvPr>
+          <p:cNvCxnSpPr>
+            <a:cxnSpLocks noGrp="1" noRot="1" noChangeAspect="1" noMove="1" noResize="1" noEditPoints="1" noAdjustHandles="1" noChangeArrowheads="1" noChangeShapeType="1"/>
+          </p:cNvCxnSpPr>
+          <p:nvPr>
+            <p:extLst>
+              <p:ext uri="{386F3935-93C4-4BCD-93E2-E3B085C9AB24}">
+                <p16:designElem xmlns:p16="http://schemas.microsoft.com/office/powerpoint/2015/main" val="1"/>
+              </p:ext>
+            </p:extLst>
+          </p:nvPr>
+        </p:nvCxnSpPr>
+        <p:spPr>
+          <a:xfrm flipH="1">
+            <a:off x="1014141" y="5408571"/>
+            <a:ext cx="3932030" cy="0"/>
+          </a:xfrm>
+          <a:prstGeom prst="line">
+            <a:avLst/>
+          </a:prstGeom>
+          <a:ln w="12700">
+            <a:solidFill>
+              <a:schemeClr val="accent2"/>
+            </a:solidFill>
+          </a:ln>
+        </p:spPr>
+        <p:style>
+          <a:lnRef idx="1">
+            <a:schemeClr val="accent1"/>
+          </a:lnRef>
+          <a:fillRef idx="0">
+            <a:schemeClr val="accent1"/>
+          </a:fillRef>
+          <a:effectRef idx="0">
+            <a:schemeClr val="accent1"/>
+          </a:effectRef>
+          <a:fontRef idx="minor">
+            <a:schemeClr val="tx1"/>
+          </a:fontRef>
+        </p:style>
+      </p:cxnSp>
+      <p:sp>
+        <p:nvSpPr>
+          <p:cNvPr id="3" name="Content Placeholder 2">
+            <a:extLst>
+              <a:ext uri="{FF2B5EF4-FFF2-40B4-BE49-F238E27FC236}">
+                <a16:creationId xmlns:a16="http://schemas.microsoft.com/office/drawing/2014/main" id="{BF6387C6-3A3A-ED00-D649-6CCE37F720FD}"/>
+              </a:ext>
+            </a:extLst>
+          </p:cNvPr>
+          <p:cNvSpPr>
+            <a:spLocks noGrp="1"/>
+          </p:cNvSpPr>
+          <p:nvPr>
+            <p:ph idx="1"/>
+          </p:nvPr>
+        </p:nvSpPr>
+        <p:spPr>
+          <a:xfrm>
             <a:off x="5252937" y="1108061"/>
             <a:ext cx="6581538" cy="4571972"/>
           </a:xfrm>
@@ -6876,7 +7501,686 @@
 </p:sld>
 </file>
 
-<file path=ppt/slides/slide14.xml><?xml version="1.0" encoding="utf-8"?>
+<file path=ppt/slides/slide15.xml><?xml version="1.0" encoding="utf-8"?>
+<p:sld xmlns:a="http://schemas.openxmlformats.org/drawingml/2006/main" xmlns:r="http://schemas.openxmlformats.org/officeDocument/2006/relationships" xmlns:p="http://schemas.openxmlformats.org/presentationml/2006/main">
+  <p:cSld>
+    <p:bg>
+      <p:bgPr>
+        <a:solidFill>
+          <a:schemeClr val="bg1"/>
+        </a:solidFill>
+        <a:effectLst/>
+      </p:bgPr>
+    </p:bg>
+    <p:spTree>
+      <p:nvGrpSpPr>
+        <p:cNvPr id="1" name=""/>
+        <p:cNvGrpSpPr/>
+        <p:nvPr/>
+      </p:nvGrpSpPr>
+      <p:grpSpPr>
+        <a:xfrm>
+          <a:off x="0" y="0"/>
+          <a:ext cx="0" cy="0"/>
+          <a:chOff x="0" y="0"/>
+          <a:chExt cx="0" cy="0"/>
+        </a:xfrm>
+      </p:grpSpPr>
+      <p:sp>
+        <p:nvSpPr>
+          <p:cNvPr id="8" name="Rectangle 7">
+            <a:extLst>
+              <a:ext uri="{FF2B5EF4-FFF2-40B4-BE49-F238E27FC236}">
+                <a16:creationId xmlns:a16="http://schemas.microsoft.com/office/drawing/2014/main" id="{E8A8EAB8-D2FF-444D-B34B-7D32F106AD0E}"/>
+              </a:ext>
+              <a:ext uri="{C183D7F6-B498-43B3-948B-1728B52AA6E4}">
+                <adec:decorative xmlns:adec="http://schemas.microsoft.com/office/drawing/2017/decorative" val="1"/>
+              </a:ext>
+            </a:extLst>
+          </p:cNvPr>
+          <p:cNvSpPr>
+            <a:spLocks noGrp="1" noRot="1" noChangeAspect="1" noMove="1" noResize="1" noEditPoints="1" noAdjustHandles="1" noChangeArrowheads="1" noChangeShapeType="1" noTextEdit="1"/>
+          </p:cNvSpPr>
+          <p:nvPr>
+            <p:extLst>
+              <p:ext uri="{386F3935-93C4-4BCD-93E2-E3B085C9AB24}">
+                <p16:designElem xmlns:p16="http://schemas.microsoft.com/office/powerpoint/2015/main" val="1"/>
+              </p:ext>
+            </p:extLst>
+          </p:nvPr>
+        </p:nvSpPr>
+        <p:spPr>
+          <a:xfrm>
+            <a:off x="0" y="0"/>
+            <a:ext cx="12192000" cy="6858000"/>
+          </a:xfrm>
+          <a:prstGeom prst="rect">
+            <a:avLst/>
+          </a:prstGeom>
+          <a:solidFill>
+            <a:schemeClr val="tx1">
+              <a:lumMod val="95000"/>
+              <a:lumOff val="5000"/>
+            </a:schemeClr>
+          </a:solidFill>
+          <a:ln>
+            <a:noFill/>
+          </a:ln>
+        </p:spPr>
+        <p:style>
+          <a:lnRef idx="2">
+            <a:schemeClr val="accent1">
+              <a:shade val="50000"/>
+            </a:schemeClr>
+          </a:lnRef>
+          <a:fillRef idx="1">
+            <a:schemeClr val="accent1"/>
+          </a:fillRef>
+          <a:effectRef idx="0">
+            <a:schemeClr val="accent1"/>
+          </a:effectRef>
+          <a:fontRef idx="minor">
+            <a:schemeClr val="lt1"/>
+          </a:fontRef>
+        </p:style>
+        <p:txBody>
+          <a:bodyPr rtlCol="0" anchor="ctr"/>
+          <a:lstStyle/>
+          <a:p>
+            <a:pPr algn="ctr"/>
+            <a:endParaRPr lang="en-US" dirty="0">
+              <a:solidFill>
+                <a:schemeClr val="bg1"/>
+              </a:solidFill>
+            </a:endParaRPr>
+          </a:p>
+        </p:txBody>
+      </p:sp>
+      <p:sp>
+        <p:nvSpPr>
+          <p:cNvPr id="2" name="Title 1">
+            <a:extLst>
+              <a:ext uri="{FF2B5EF4-FFF2-40B4-BE49-F238E27FC236}">
+                <a16:creationId xmlns:a16="http://schemas.microsoft.com/office/drawing/2014/main" id="{0833764A-6054-E198-9B9B-D9EBC1F4D245}"/>
+              </a:ext>
+            </a:extLst>
+          </p:cNvPr>
+          <p:cNvSpPr>
+            <a:spLocks noGrp="1"/>
+          </p:cNvSpPr>
+          <p:nvPr>
+            <p:ph type="title"/>
+          </p:nvPr>
+        </p:nvSpPr>
+        <p:spPr>
+          <a:xfrm>
+            <a:off x="852014" y="1491187"/>
+            <a:ext cx="4515689" cy="3916159"/>
+          </a:xfrm>
+        </p:spPr>
+        <p:txBody>
+          <a:bodyPr anchor="ctr">
+            <a:normAutofit/>
+          </a:bodyPr>
+          <a:lstStyle/>
+          <a:p>
+            <a:r>
+              <a:rPr lang="en-GB" sz="8000" dirty="0">
+                <a:solidFill>
+                  <a:srgbClr val="FFFFFF"/>
+                </a:solidFill>
+                <a:latin typeface="Calibri Light"/>
+                <a:ea typeface="Calibri Light"/>
+                <a:cs typeface="Calibri Light"/>
+              </a:rPr>
+              <a:t>Install Babel</a:t>
+            </a:r>
+            <a:endParaRPr lang="en-US" dirty="0"/>
+          </a:p>
+        </p:txBody>
+      </p:sp>
+      <p:cxnSp>
+        <p:nvCxnSpPr>
+          <p:cNvPr id="10" name="Straight Connector 9">
+            <a:extLst>
+              <a:ext uri="{FF2B5EF4-FFF2-40B4-BE49-F238E27FC236}">
+                <a16:creationId xmlns:a16="http://schemas.microsoft.com/office/drawing/2014/main" id="{067633D1-6EE6-4118-B9F0-B363477BEE7A}"/>
+              </a:ext>
+              <a:ext uri="{C183D7F6-B498-43B3-948B-1728B52AA6E4}">
+                <adec:decorative xmlns:adec="http://schemas.microsoft.com/office/drawing/2017/decorative" val="1"/>
+              </a:ext>
+            </a:extLst>
+          </p:cNvPr>
+          <p:cNvCxnSpPr>
+            <a:cxnSpLocks noGrp="1" noRot="1" noChangeAspect="1" noMove="1" noResize="1" noEditPoints="1" noAdjustHandles="1" noChangeArrowheads="1" noChangeShapeType="1"/>
+          </p:cNvCxnSpPr>
+          <p:nvPr>
+            <p:extLst>
+              <p:ext uri="{386F3935-93C4-4BCD-93E2-E3B085C9AB24}">
+                <p16:designElem xmlns:p16="http://schemas.microsoft.com/office/powerpoint/2015/main" val="1"/>
+              </p:ext>
+            </p:extLst>
+          </p:nvPr>
+        </p:nvCxnSpPr>
+        <p:spPr>
+          <a:xfrm flipH="1">
+            <a:off x="1014141" y="1450655"/>
+            <a:ext cx="3932030" cy="0"/>
+          </a:xfrm>
+          <a:prstGeom prst="line">
+            <a:avLst/>
+          </a:prstGeom>
+          <a:ln w="12700">
+            <a:solidFill>
+              <a:schemeClr val="accent2"/>
+            </a:solidFill>
+          </a:ln>
+        </p:spPr>
+        <p:style>
+          <a:lnRef idx="1">
+            <a:schemeClr val="accent1"/>
+          </a:lnRef>
+          <a:fillRef idx="0">
+            <a:schemeClr val="accent1"/>
+          </a:fillRef>
+          <a:effectRef idx="0">
+            <a:schemeClr val="accent1"/>
+          </a:effectRef>
+          <a:fontRef idx="minor">
+            <a:schemeClr val="tx1"/>
+          </a:fontRef>
+        </p:style>
+      </p:cxnSp>
+      <p:cxnSp>
+        <p:nvCxnSpPr>
+          <p:cNvPr id="12" name="Straight Connector 11">
+            <a:extLst>
+              <a:ext uri="{FF2B5EF4-FFF2-40B4-BE49-F238E27FC236}">
+                <a16:creationId xmlns:a16="http://schemas.microsoft.com/office/drawing/2014/main" id="{4AD7FFC6-42A9-49CB-B5E9-B3F6B038331B}"/>
+              </a:ext>
+              <a:ext uri="{C183D7F6-B498-43B3-948B-1728B52AA6E4}">
+                <adec:decorative xmlns:adec="http://schemas.microsoft.com/office/drawing/2017/decorative" val="1"/>
+              </a:ext>
+            </a:extLst>
+          </p:cNvPr>
+          <p:cNvCxnSpPr>
+            <a:cxnSpLocks noGrp="1" noRot="1" noChangeAspect="1" noMove="1" noResize="1" noEditPoints="1" noAdjustHandles="1" noChangeArrowheads="1" noChangeShapeType="1"/>
+          </p:cNvCxnSpPr>
+          <p:nvPr>
+            <p:extLst>
+              <p:ext uri="{386F3935-93C4-4BCD-93E2-E3B085C9AB24}">
+                <p16:designElem xmlns:p16="http://schemas.microsoft.com/office/powerpoint/2015/main" val="1"/>
+              </p:ext>
+            </p:extLst>
+          </p:nvPr>
+        </p:nvCxnSpPr>
+        <p:spPr>
+          <a:xfrm flipH="1">
+            <a:off x="1014141" y="5408571"/>
+            <a:ext cx="3932030" cy="0"/>
+          </a:xfrm>
+          <a:prstGeom prst="line">
+            <a:avLst/>
+          </a:prstGeom>
+          <a:ln w="12700">
+            <a:solidFill>
+              <a:schemeClr val="accent2"/>
+            </a:solidFill>
+          </a:ln>
+        </p:spPr>
+        <p:style>
+          <a:lnRef idx="1">
+            <a:schemeClr val="accent1"/>
+          </a:lnRef>
+          <a:fillRef idx="0">
+            <a:schemeClr val="accent1"/>
+          </a:fillRef>
+          <a:effectRef idx="0">
+            <a:schemeClr val="accent1"/>
+          </a:effectRef>
+          <a:fontRef idx="minor">
+            <a:schemeClr val="tx1"/>
+          </a:fontRef>
+        </p:style>
+      </p:cxnSp>
+      <p:sp>
+        <p:nvSpPr>
+          <p:cNvPr id="3" name="Content Placeholder 2">
+            <a:extLst>
+              <a:ext uri="{FF2B5EF4-FFF2-40B4-BE49-F238E27FC236}">
+                <a16:creationId xmlns:a16="http://schemas.microsoft.com/office/drawing/2014/main" id="{BF6387C6-3A3A-ED00-D649-6CCE37F720FD}"/>
+              </a:ext>
+            </a:extLst>
+          </p:cNvPr>
+          <p:cNvSpPr>
+            <a:spLocks noGrp="1"/>
+          </p:cNvSpPr>
+          <p:nvPr>
+            <p:ph idx="1"/>
+          </p:nvPr>
+        </p:nvSpPr>
+        <p:spPr>
+          <a:xfrm>
+            <a:off x="5366668" y="1921240"/>
+            <a:ext cx="6581538" cy="4571972"/>
+          </a:xfrm>
+        </p:spPr>
+        <p:txBody>
+          <a:bodyPr vert="horz" lIns="91440" tIns="45720" rIns="91440" bIns="45720" rtlCol="0" anchor="ctr">
+            <a:normAutofit/>
+          </a:bodyPr>
+          <a:lstStyle/>
+          <a:p>
+            <a:pPr marL="0" indent="0">
+              <a:buNone/>
+            </a:pPr>
+            <a:r>
+              <a:rPr lang="en-GB" sz="2000" dirty="0">
+                <a:solidFill>
+                  <a:srgbClr val="D1D5DB"/>
+                </a:solidFill>
+                <a:latin typeface="Arial"/>
+                <a:ea typeface="+mn-lt"/>
+                <a:cs typeface="+mn-lt"/>
+              </a:rPr>
+              <a:t>Install Babel and necessary loaders and plugins:</a:t>
+            </a:r>
+          </a:p>
+          <a:p>
+            <a:pPr marL="457200" indent="-457200">
+              <a:buAutoNum type="arabicPeriod"/>
+            </a:pPr>
+            <a:r>
+              <a:rPr lang="en-GB" sz="2000" dirty="0" err="1">
+                <a:solidFill>
+                  <a:srgbClr val="D1D5DB"/>
+                </a:solidFill>
+                <a:latin typeface="Arial"/>
+                <a:ea typeface="+mn-lt"/>
+                <a:cs typeface="Arial"/>
+              </a:rPr>
+              <a:t>npm</a:t>
+            </a:r>
+            <a:r>
+              <a:rPr lang="en-GB" sz="2000" dirty="0">
+                <a:solidFill>
+                  <a:srgbClr val="D1D5DB"/>
+                </a:solidFill>
+                <a:latin typeface="Arial"/>
+                <a:ea typeface="+mn-lt"/>
+                <a:cs typeface="Arial"/>
+              </a:rPr>
+              <a:t> install --save-dev babel-loader @babel/core @babel/preset-env @babel/preset-react</a:t>
+            </a:r>
+          </a:p>
+          <a:p>
+            <a:pPr marL="457200" indent="-457200">
+              <a:buAutoNum type="arabicPeriod"/>
+            </a:pPr>
+            <a:endParaRPr lang="en-GB" sz="2000" dirty="0">
+              <a:solidFill>
+                <a:srgbClr val="D1D5DB"/>
+              </a:solidFill>
+              <a:latin typeface="Arial"/>
+              <a:ea typeface="Calibri"/>
+              <a:cs typeface="Arial"/>
+            </a:endParaRPr>
+          </a:p>
+          <a:p>
+            <a:pPr marL="0" indent="0">
+              <a:buNone/>
+            </a:pPr>
+            <a:r>
+              <a:rPr lang="en-GB" sz="2000" dirty="0">
+                <a:solidFill>
+                  <a:srgbClr val="D1D5DB"/>
+                </a:solidFill>
+                <a:latin typeface="Arial"/>
+                <a:ea typeface="Calibri"/>
+                <a:cs typeface="Arial"/>
+              </a:rPr>
+              <a:t>Create a file .</a:t>
+            </a:r>
+            <a:r>
+              <a:rPr lang="en-GB" sz="2000" dirty="0" err="1">
+                <a:solidFill>
+                  <a:srgbClr val="D1D5DB"/>
+                </a:solidFill>
+                <a:latin typeface="Arial"/>
+                <a:ea typeface="Calibri"/>
+                <a:cs typeface="Arial"/>
+              </a:rPr>
+              <a:t>babelrc</a:t>
+            </a:r>
+            <a:endParaRPr lang="en-GB" sz="2000" dirty="0">
+              <a:solidFill>
+                <a:srgbClr val="D1D5DB"/>
+              </a:solidFill>
+              <a:latin typeface="Arial"/>
+              <a:ea typeface="Calibri"/>
+              <a:cs typeface="Arial"/>
+            </a:endParaRPr>
+          </a:p>
+          <a:p>
+            <a:pPr marL="0" indent="0">
+              <a:buNone/>
+            </a:pPr>
+            <a:endParaRPr lang="en-GB" sz="2000" dirty="0">
+              <a:solidFill>
+                <a:srgbClr val="D1D5DB"/>
+              </a:solidFill>
+              <a:latin typeface="Arial"/>
+              <a:ea typeface="Calibri"/>
+              <a:cs typeface="Arial"/>
+            </a:endParaRPr>
+          </a:p>
+          <a:p>
+            <a:pPr>
+              <a:buNone/>
+            </a:pPr>
+            <a:r>
+              <a:rPr lang="en-GB" sz="1800" dirty="0">
+                <a:solidFill>
+                  <a:srgbClr val="89DDFF"/>
+                </a:solidFill>
+                <a:latin typeface="Menlo"/>
+                <a:ea typeface="Calibri"/>
+                <a:cs typeface="Arial"/>
+              </a:rPr>
+              <a:t>{</a:t>
+            </a:r>
+            <a:endParaRPr lang="en-GB" sz="1800" dirty="0">
+              <a:ea typeface="Calibri"/>
+              <a:cs typeface="Calibri"/>
+            </a:endParaRPr>
+          </a:p>
+          <a:p>
+            <a:pPr>
+              <a:buNone/>
+            </a:pPr>
+            <a:r>
+              <a:rPr lang="en-GB" sz="1800" dirty="0">
+                <a:solidFill>
+                  <a:srgbClr val="89DDFF"/>
+                </a:solidFill>
+                <a:latin typeface="Menlo"/>
+                <a:ea typeface="Calibri"/>
+                <a:cs typeface="Arial"/>
+              </a:rPr>
+              <a:t>  "</a:t>
+            </a:r>
+            <a:r>
+              <a:rPr lang="en-GB" sz="1800" dirty="0">
+                <a:solidFill>
+                  <a:srgbClr val="C792EA"/>
+                </a:solidFill>
+                <a:latin typeface="Menlo"/>
+                <a:ea typeface="Calibri"/>
+                <a:cs typeface="Arial"/>
+              </a:rPr>
+              <a:t>presets</a:t>
+            </a:r>
+            <a:r>
+              <a:rPr lang="en-GB" sz="1800" dirty="0">
+                <a:solidFill>
+                  <a:srgbClr val="89DDFF"/>
+                </a:solidFill>
+                <a:latin typeface="Menlo"/>
+                <a:ea typeface="Calibri"/>
+                <a:cs typeface="Arial"/>
+              </a:rPr>
+              <a:t>":</a:t>
+            </a:r>
+            <a:r>
+              <a:rPr lang="en-GB" sz="1800" dirty="0">
+                <a:solidFill>
+                  <a:srgbClr val="BABED8"/>
+                </a:solidFill>
+                <a:latin typeface="Menlo"/>
+                <a:ea typeface="Calibri"/>
+                <a:cs typeface="Arial"/>
+              </a:rPr>
+              <a:t> </a:t>
+            </a:r>
+            <a:r>
+              <a:rPr lang="en-GB" sz="1800" dirty="0">
+                <a:solidFill>
+                  <a:srgbClr val="89DDFF"/>
+                </a:solidFill>
+                <a:latin typeface="Menlo"/>
+                <a:ea typeface="Calibri"/>
+                <a:cs typeface="Arial"/>
+              </a:rPr>
+              <a:t>[</a:t>
+            </a:r>
+            <a:endParaRPr lang="en-GB" sz="1800" dirty="0">
+              <a:ea typeface="Calibri"/>
+              <a:cs typeface="Calibri"/>
+            </a:endParaRPr>
+          </a:p>
+          <a:p>
+            <a:pPr>
+              <a:buNone/>
+            </a:pPr>
+            <a:r>
+              <a:rPr lang="en-GB" sz="1800" dirty="0">
+                <a:solidFill>
+                  <a:srgbClr val="89DDFF"/>
+                </a:solidFill>
+                <a:latin typeface="Menlo"/>
+                <a:ea typeface="Calibri"/>
+                <a:cs typeface="Arial"/>
+              </a:rPr>
+              <a:t>     "</a:t>
+            </a:r>
+            <a:r>
+              <a:rPr lang="en-GB" sz="1800" dirty="0">
+                <a:solidFill>
+                  <a:srgbClr val="C3E88D"/>
+                </a:solidFill>
+                <a:latin typeface="Menlo"/>
+                <a:ea typeface="Calibri"/>
+                <a:cs typeface="Arial"/>
+              </a:rPr>
+              <a:t>@babel/preset-env</a:t>
+            </a:r>
+            <a:r>
+              <a:rPr lang="en-GB" sz="1800" dirty="0">
+                <a:solidFill>
+                  <a:srgbClr val="89DDFF"/>
+                </a:solidFill>
+                <a:latin typeface="Menlo"/>
+                <a:ea typeface="Calibri"/>
+                <a:cs typeface="Arial"/>
+              </a:rPr>
+              <a:t>",</a:t>
+            </a:r>
+            <a:endParaRPr lang="en-GB" sz="1800" dirty="0">
+              <a:solidFill>
+                <a:srgbClr val="000000"/>
+              </a:solidFill>
+              <a:latin typeface="Calibri" panose="020F0502020204030204"/>
+              <a:ea typeface="Calibri"/>
+              <a:cs typeface="Calibri"/>
+            </a:endParaRPr>
+          </a:p>
+          <a:p>
+            <a:pPr>
+              <a:buNone/>
+            </a:pPr>
+            <a:r>
+              <a:rPr lang="en-GB" sz="1800" dirty="0">
+                <a:solidFill>
+                  <a:srgbClr val="89DDFF"/>
+                </a:solidFill>
+                <a:latin typeface="Menlo"/>
+                <a:ea typeface="Calibri"/>
+                <a:cs typeface="Arial"/>
+              </a:rPr>
+              <a:t>     "</a:t>
+            </a:r>
+            <a:r>
+              <a:rPr lang="en-GB" sz="1800" dirty="0">
+                <a:solidFill>
+                  <a:srgbClr val="C3E88D"/>
+                </a:solidFill>
+                <a:latin typeface="Menlo"/>
+                <a:ea typeface="Calibri"/>
+                <a:cs typeface="Arial"/>
+              </a:rPr>
+              <a:t>@babel/preset-react</a:t>
+            </a:r>
+            <a:r>
+              <a:rPr lang="en-GB" sz="1800" dirty="0">
+                <a:solidFill>
+                  <a:srgbClr val="89DDFF"/>
+                </a:solidFill>
+                <a:latin typeface="Menlo"/>
+                <a:ea typeface="Calibri"/>
+                <a:cs typeface="Arial"/>
+              </a:rPr>
+              <a:t>"</a:t>
+            </a:r>
+            <a:endParaRPr lang="en-GB" sz="1800" dirty="0">
+              <a:ea typeface="Calibri"/>
+              <a:cs typeface="Calibri"/>
+            </a:endParaRPr>
+          </a:p>
+          <a:p>
+            <a:pPr>
+              <a:buNone/>
+            </a:pPr>
+            <a:r>
+              <a:rPr lang="en-GB" sz="1800" dirty="0">
+                <a:solidFill>
+                  <a:srgbClr val="89DDFF"/>
+                </a:solidFill>
+                <a:latin typeface="Menlo"/>
+                <a:ea typeface="Calibri"/>
+                <a:cs typeface="Arial"/>
+              </a:rPr>
+              <a:t>   ]</a:t>
+            </a:r>
+            <a:endParaRPr lang="en-GB" sz="1800" dirty="0">
+              <a:ea typeface="Calibri"/>
+              <a:cs typeface="Calibri"/>
+            </a:endParaRPr>
+          </a:p>
+          <a:p>
+            <a:pPr>
+              <a:buNone/>
+            </a:pPr>
+            <a:r>
+              <a:rPr lang="en-GB" sz="1800" dirty="0">
+                <a:solidFill>
+                  <a:srgbClr val="89DDFF"/>
+                </a:solidFill>
+                <a:latin typeface="Menlo"/>
+                <a:ea typeface="Calibri"/>
+                <a:cs typeface="Arial"/>
+              </a:rPr>
+              <a:t>}</a:t>
+            </a:r>
+            <a:endParaRPr lang="en-GB" sz="1800" dirty="0"/>
+          </a:p>
+          <a:p>
+            <a:pPr marL="0" indent="0">
+              <a:buNone/>
+            </a:pPr>
+            <a:endParaRPr lang="en-GB" sz="2000" dirty="0">
+              <a:solidFill>
+                <a:srgbClr val="D1D5DB"/>
+              </a:solidFill>
+              <a:latin typeface="Arial"/>
+              <a:ea typeface="Calibri"/>
+              <a:cs typeface="Arial"/>
+            </a:endParaRPr>
+          </a:p>
+          <a:p>
+            <a:pPr marL="342900" indent="-342900">
+              <a:buAutoNum type="arabicPeriod"/>
+            </a:pPr>
+            <a:endParaRPr lang="en-GB" sz="2000" dirty="0">
+              <a:solidFill>
+                <a:srgbClr val="D1D5DB"/>
+              </a:solidFill>
+              <a:latin typeface="Arial"/>
+              <a:ea typeface="Calibri"/>
+              <a:cs typeface="Arial"/>
+            </a:endParaRPr>
+          </a:p>
+          <a:p>
+            <a:pPr marL="342900" indent="-342900">
+              <a:buAutoNum type="arabicPeriod"/>
+            </a:pPr>
+            <a:endParaRPr lang="en-GB" sz="2000" dirty="0">
+              <a:solidFill>
+                <a:srgbClr val="D1D5DB"/>
+              </a:solidFill>
+              <a:latin typeface="Arial"/>
+              <a:ea typeface="Calibri"/>
+              <a:cs typeface="Arial"/>
+            </a:endParaRPr>
+          </a:p>
+          <a:p>
+            <a:pPr marL="0" indent="0">
+              <a:buNone/>
+            </a:pPr>
+            <a:endParaRPr lang="en-GB" sz="2000" dirty="0">
+              <a:solidFill>
+                <a:srgbClr val="D1D5DB"/>
+              </a:solidFill>
+              <a:latin typeface="Arial"/>
+              <a:ea typeface="Calibri"/>
+              <a:cs typeface="Calibri"/>
+            </a:endParaRPr>
+          </a:p>
+        </p:txBody>
+      </p:sp>
+      <p:pic>
+        <p:nvPicPr>
+          <p:cNvPr id="6" name="Picture 5" descr="A couple of yellow cartoon characters&#10;&#10;Description automatically generated">
+            <a:extLst>
+              <a:ext uri="{FF2B5EF4-FFF2-40B4-BE49-F238E27FC236}">
+                <a16:creationId xmlns:a16="http://schemas.microsoft.com/office/drawing/2014/main" id="{613F53E4-F588-E339-4238-FD6621D61BA8}"/>
+              </a:ext>
+            </a:extLst>
+          </p:cNvPr>
+          <p:cNvPicPr>
+            <a:picLocks noChangeAspect="1"/>
+          </p:cNvPicPr>
+          <p:nvPr/>
+        </p:nvPicPr>
+        <p:blipFill>
+          <a:blip r:embed="rId2"/>
+          <a:stretch>
+            <a:fillRect/>
+          </a:stretch>
+        </p:blipFill>
+        <p:spPr>
+          <a:xfrm>
+            <a:off x="9380294" y="5041490"/>
+            <a:ext cx="3425735" cy="1751976"/>
+          </a:xfrm>
+          <a:prstGeom prst="rect">
+            <a:avLst/>
+          </a:prstGeom>
+        </p:spPr>
+      </p:pic>
+    </p:spTree>
+    <p:extLst>
+      <p:ext uri="{BB962C8B-B14F-4D97-AF65-F5344CB8AC3E}">
+        <p14:creationId xmlns:p14="http://schemas.microsoft.com/office/powerpoint/2010/main" val="2393684056"/>
+      </p:ext>
+    </p:extLst>
+  </p:cSld>
+  <p:clrMapOvr>
+    <a:masterClrMapping/>
+  </p:clrMapOvr>
+</p:sld>
+</file>
+
+<file path=ppt/slides/slide16.xml><?xml version="1.0" encoding="utf-8"?>
 <p:sld xmlns:a="http://schemas.openxmlformats.org/drawingml/2006/main" xmlns:r="http://schemas.openxmlformats.org/officeDocument/2006/relationships" xmlns:p="http://schemas.openxmlformats.org/presentationml/2006/main">
   <p:cSld>
     <p:bg>
@@ -7326,7 +8630,7 @@
 </p:sld>
 </file>
 
-<file path=ppt/slides/slide15.xml><?xml version="1.0" encoding="utf-8"?>
+<file path=ppt/slides/slide17.xml><?xml version="1.0" encoding="utf-8"?>
 <p:sld xmlns:a="http://schemas.openxmlformats.org/drawingml/2006/main" xmlns:r="http://schemas.openxmlformats.org/officeDocument/2006/relationships" xmlns:p="http://schemas.openxmlformats.org/presentationml/2006/main">
   <p:cSld>
     <p:bg>
@@ -7762,7 +9066,7 @@
 </p:sld>
 </file>
 
-<file path=ppt/slides/slide16.xml><?xml version="1.0" encoding="utf-8"?>
+<file path=ppt/slides/slide18.xml><?xml version="1.0" encoding="utf-8"?>
 <p:sld xmlns:a="http://schemas.openxmlformats.org/drawingml/2006/main" xmlns:r="http://schemas.openxmlformats.org/officeDocument/2006/relationships" xmlns:p="http://schemas.openxmlformats.org/presentationml/2006/main">
   <p:cSld>
     <p:bg>
@@ -8237,7 +9541,7 @@
 </p:sld>
 </file>
 
-<file path=ppt/slides/slide17.xml><?xml version="1.0" encoding="utf-8"?>
+<file path=ppt/slides/slide19.xml><?xml version="1.0" encoding="utf-8"?>
 <p:sld xmlns:a="http://schemas.openxmlformats.org/drawingml/2006/main" xmlns:r="http://schemas.openxmlformats.org/officeDocument/2006/relationships" xmlns:p="http://schemas.openxmlformats.org/presentationml/2006/main">
   <p:cSld>
     <p:bg>
@@ -8695,7 +9999,7 @@
 </p:sld>
 </file>
 
-<file path=ppt/slides/slide18.xml><?xml version="1.0" encoding="utf-8"?>
+<file path=ppt/slides/slide2.xml><?xml version="1.0" encoding="utf-8"?>
 <p:sld xmlns:a="http://schemas.openxmlformats.org/drawingml/2006/main" xmlns:r="http://schemas.openxmlformats.org/officeDocument/2006/relationships" xmlns:p="http://schemas.openxmlformats.org/presentationml/2006/main">
   <p:cSld>
     <p:bg>
@@ -8722,7 +10026,7 @@
       </p:grpSpPr>
       <p:sp>
         <p:nvSpPr>
-          <p:cNvPr id="26" name="Rectangle 25">
+          <p:cNvPr id="37" name="Rectangle 36">
             <a:extLst>
               <a:ext uri="{FF2B5EF4-FFF2-40B4-BE49-F238E27FC236}">
                 <a16:creationId xmlns:a16="http://schemas.microsoft.com/office/drawing/2014/main" id="{B250C39F-3F6C-4D53-86D2-7BC6B2FF609C}"/>
@@ -8788,10 +10092,10 @@
       </p:sp>
       <p:pic>
         <p:nvPicPr>
-          <p:cNvPr id="6" name="Picture 5" descr="A couple of yellow cartoon characters&#10;&#10;Description automatically generated">
+          <p:cNvPr id="4" name="Picture 3" descr="A cartoon character holding a notebook&#10;&#10;Description automatically generated">
             <a:extLst>
               <a:ext uri="{FF2B5EF4-FFF2-40B4-BE49-F238E27FC236}">
-                <a16:creationId xmlns:a16="http://schemas.microsoft.com/office/drawing/2014/main" id="{613F53E4-F588-E339-4238-FD6621D61BA8}"/>
+                <a16:creationId xmlns:a16="http://schemas.microsoft.com/office/drawing/2014/main" id="{FFAFD5CF-45DC-0120-1519-A4DD0C9F8F39}"/>
               </a:ext>
             </a:extLst>
           </p:cNvPr>
@@ -8802,13 +10106,13 @@
         </p:nvPicPr>
         <p:blipFill rotWithShape="1">
           <a:blip r:embed="rId2"/>
-          <a:srcRect l="7001" r="2333" b="1"/>
+          <a:srcRect t="16784" b="37794"/>
           <a:stretch/>
         </p:blipFill>
         <p:spPr>
           <a:xfrm>
-            <a:off x="20" y="10"/>
-            <a:ext cx="12191980" cy="6857990"/>
+            <a:off x="5155680" y="907925"/>
+            <a:ext cx="9160193" cy="5155650"/>
           </a:xfrm>
           <a:prstGeom prst="rect">
             <a:avLst/>
@@ -8817,7 +10121,7 @@
       </p:pic>
       <p:sp>
         <p:nvSpPr>
-          <p:cNvPr id="28" name="Rectangle 27">
+          <p:cNvPr id="39" name="Rectangle 38">
             <a:extLst>
               <a:ext uri="{FF2B5EF4-FFF2-40B4-BE49-F238E27FC236}">
                 <a16:creationId xmlns:a16="http://schemas.microsoft.com/office/drawing/2014/main" id="{70A48D59-8581-41F7-B529-F4617FE07A9A}"/>
@@ -8898,7 +10202,7 @@
           <p:cNvPr id="2" name="Title 1">
             <a:extLst>
               <a:ext uri="{FF2B5EF4-FFF2-40B4-BE49-F238E27FC236}">
-                <a16:creationId xmlns:a16="http://schemas.microsoft.com/office/drawing/2014/main" id="{0833764A-6054-E198-9B9B-D9EBC1F4D245}"/>
+                <a16:creationId xmlns:a16="http://schemas.microsoft.com/office/drawing/2014/main" id="{F79E16CB-DAC4-717E-0E7D-DD909F18D66F}"/>
               </a:ext>
             </a:extLst>
           </p:cNvPr>
@@ -8911,7 +10215,7 @@
         </p:nvSpPr>
         <p:spPr>
           <a:xfrm>
-            <a:off x="1104900" y="910431"/>
+            <a:off x="1104900" y="-127186"/>
             <a:ext cx="4724400" cy="1466455"/>
           </a:xfrm>
         </p:spPr>
@@ -8926,10 +10230,16 @@
                 <a:solidFill>
                   <a:schemeClr val="bg1"/>
                 </a:solidFill>
+                <a:ea typeface="Calibri Light"/>
                 <a:cs typeface="Calibri Light"/>
               </a:rPr>
-              <a:t>Example</a:t>
-            </a:r>
+              <a:t>Agenda</a:t>
+            </a:r>
+            <a:endParaRPr lang="en-GB">
+              <a:solidFill>
+                <a:schemeClr val="bg1"/>
+              </a:solidFill>
+            </a:endParaRPr>
           </a:p>
         </p:txBody>
       </p:sp>
@@ -8938,7 +10248,7 @@
           <p:cNvPr id="3" name="Content Placeholder 2">
             <a:extLst>
               <a:ext uri="{FF2B5EF4-FFF2-40B4-BE49-F238E27FC236}">
-                <a16:creationId xmlns:a16="http://schemas.microsoft.com/office/drawing/2014/main" id="{BF6387C6-3A3A-ED00-D649-6CCE37F720FD}"/>
+                <a16:creationId xmlns:a16="http://schemas.microsoft.com/office/drawing/2014/main" id="{6BC158D1-70BE-32F3-7EAB-1E4704A43B35}"/>
               </a:ext>
             </a:extLst>
           </p:cNvPr>
@@ -8951,238 +10261,185 @@
         </p:nvSpPr>
         <p:spPr>
           <a:xfrm>
-            <a:off x="1104900" y="2702846"/>
-            <a:ext cx="5081080" cy="3242827"/>
+            <a:off x="1104900" y="1486888"/>
+            <a:ext cx="4724400" cy="3015849"/>
           </a:xfrm>
         </p:spPr>
         <p:txBody>
           <a:bodyPr vert="horz" lIns="91440" tIns="45720" rIns="91440" bIns="45720" rtlCol="0" anchor="t">
-            <a:normAutofit/>
+            <a:noAutofit/>
           </a:bodyPr>
           <a:lstStyle/>
           <a:p>
-            <a:pPr>
-              <a:lnSpc>
-                <a:spcPct val="70000"/>
-              </a:lnSpc>
-              <a:buNone/>
-            </a:pPr>
-            <a:r>
-              <a:rPr lang="en-GB" sz="1800" dirty="0">
+            <a:r>
+              <a:rPr lang="en-GB" sz="2000" dirty="0">
                 <a:solidFill>
                   <a:schemeClr val="bg1"/>
                 </a:solidFill>
                 <a:latin typeface="Arial"/>
-                <a:ea typeface="+mn-lt"/>
-                <a:cs typeface="+mn-lt"/>
-              </a:rPr>
-              <a:t>import React, { Component } from 'react';</a:t>
-            </a:r>
-            <a:endParaRPr lang="en-US" sz="1800">
-              <a:solidFill>
-                <a:schemeClr val="bg1"/>
-              </a:solidFill>
-              <a:latin typeface="Arial"/>
-              <a:cs typeface="Arial"/>
-            </a:endParaRPr>
-          </a:p>
-          <a:p>
-            <a:pPr>
-              <a:lnSpc>
-                <a:spcPct val="70000"/>
-              </a:lnSpc>
-              <a:buNone/>
-            </a:pPr>
-            <a:endParaRPr lang="en-GB" sz="1800" dirty="0">
-              <a:latin typeface="Arial"/>
-              <a:cs typeface="Arial"/>
-            </a:endParaRPr>
-          </a:p>
-          <a:p>
-            <a:pPr>
-              <a:lnSpc>
-                <a:spcPct val="70000"/>
-              </a:lnSpc>
-              <a:buNone/>
-            </a:pPr>
-            <a:r>
-              <a:rPr lang="en-GB" sz="1800" dirty="0">
+                <a:ea typeface="Calibri"/>
+                <a:cs typeface="Calibri"/>
+              </a:rPr>
+              <a:t>JavaScript Essentials</a:t>
+            </a:r>
+          </a:p>
+          <a:p>
+            <a:r>
+              <a:rPr lang="en-GB" sz="2000" dirty="0">
                 <a:solidFill>
                   <a:schemeClr val="bg1"/>
                 </a:solidFill>
                 <a:latin typeface="Arial"/>
-                <a:ea typeface="+mn-lt"/>
-                <a:cs typeface="+mn-lt"/>
-              </a:rPr>
-              <a:t>class HelloWorld extends Component {</a:t>
-            </a:r>
-            <a:endParaRPr lang="en-GB" sz="1800">
-              <a:solidFill>
-                <a:schemeClr val="bg1"/>
-              </a:solidFill>
-              <a:latin typeface="Arial"/>
-              <a:cs typeface="Arial"/>
-            </a:endParaRPr>
-          </a:p>
-          <a:p>
-            <a:pPr>
-              <a:lnSpc>
-                <a:spcPct val="70000"/>
-              </a:lnSpc>
-              <a:buNone/>
-            </a:pPr>
-            <a:r>
-              <a:rPr lang="en-GB" sz="1800" dirty="0">
+                <a:ea typeface="Calibri"/>
+                <a:cs typeface="Calibri"/>
+              </a:rPr>
+              <a:t>Event loop</a:t>
+            </a:r>
+          </a:p>
+          <a:p>
+            <a:r>
+              <a:rPr lang="en-GB" sz="2000" dirty="0">
                 <a:solidFill>
                   <a:schemeClr val="bg1"/>
                 </a:solidFill>
                 <a:latin typeface="Arial"/>
-                <a:ea typeface="+mn-lt"/>
-                <a:cs typeface="+mn-lt"/>
-              </a:rPr>
-              <a:t>  render() {</a:t>
-            </a:r>
-            <a:endParaRPr lang="en-GB" sz="1800">
-              <a:solidFill>
-                <a:schemeClr val="bg1"/>
-              </a:solidFill>
-              <a:latin typeface="Arial"/>
-              <a:cs typeface="Arial"/>
-            </a:endParaRPr>
-          </a:p>
-          <a:p>
-            <a:pPr>
-              <a:lnSpc>
-                <a:spcPct val="70000"/>
-              </a:lnSpc>
-              <a:buNone/>
-            </a:pPr>
-            <a:r>
-              <a:rPr lang="en-GB" sz="1800" dirty="0">
+                <a:ea typeface="Calibri"/>
+                <a:cs typeface="Calibri"/>
+              </a:rPr>
+              <a:t>React JSX</a:t>
+            </a:r>
+          </a:p>
+          <a:p>
+            <a:r>
+              <a:rPr lang="en-GB" sz="2000" dirty="0">
                 <a:solidFill>
                   <a:schemeClr val="bg1"/>
                 </a:solidFill>
                 <a:latin typeface="Arial"/>
-                <a:ea typeface="+mn-lt"/>
-                <a:cs typeface="+mn-lt"/>
-              </a:rPr>
-              <a:t>    return &lt;div&gt;Hello, World!&lt;/div&gt;;</a:t>
-            </a:r>
-            <a:endParaRPr lang="en-GB" sz="1800">
-              <a:solidFill>
-                <a:schemeClr val="bg1"/>
-              </a:solidFill>
-              <a:latin typeface="Arial"/>
-              <a:cs typeface="Arial"/>
-            </a:endParaRPr>
-          </a:p>
-          <a:p>
-            <a:pPr>
-              <a:lnSpc>
-                <a:spcPct val="70000"/>
-              </a:lnSpc>
-              <a:buNone/>
-            </a:pPr>
-            <a:r>
-              <a:rPr lang="en-GB" sz="1800" dirty="0">
+                <a:ea typeface="Calibri"/>
+                <a:cs typeface="Calibri"/>
+              </a:rPr>
+              <a:t>Libraries for </a:t>
+            </a:r>
+            <a:r>
+              <a:rPr lang="en-GB" sz="2000" err="1">
                 <a:solidFill>
                   <a:schemeClr val="bg1"/>
                 </a:solidFill>
                 <a:latin typeface="Arial"/>
-                <a:ea typeface="+mn-lt"/>
-                <a:cs typeface="+mn-lt"/>
-              </a:rPr>
-              <a:t>  }</a:t>
-            </a:r>
-            <a:endParaRPr lang="en-GB" sz="1800">
-              <a:solidFill>
-                <a:schemeClr val="bg1"/>
-              </a:solidFill>
-              <a:latin typeface="Arial"/>
-              <a:cs typeface="Arial"/>
-            </a:endParaRPr>
-          </a:p>
-          <a:p>
-            <a:pPr>
-              <a:lnSpc>
-                <a:spcPct val="70000"/>
-              </a:lnSpc>
-              <a:buNone/>
-            </a:pPr>
-            <a:r>
-              <a:rPr lang="en-GB" sz="1800" dirty="0">
+                <a:ea typeface="Calibri"/>
+                <a:cs typeface="Calibri"/>
+              </a:rPr>
+              <a:t>ClientSide</a:t>
+            </a:r>
+            <a:r>
+              <a:rPr lang="en-GB" sz="2000" dirty="0">
                 <a:solidFill>
                   <a:schemeClr val="bg1"/>
                 </a:solidFill>
                 <a:latin typeface="Arial"/>
-                <a:ea typeface="+mn-lt"/>
-                <a:cs typeface="+mn-lt"/>
-              </a:rPr>
-              <a:t>}</a:t>
-            </a:r>
-            <a:endParaRPr lang="en-GB" sz="1800">
-              <a:solidFill>
-                <a:schemeClr val="bg1"/>
-              </a:solidFill>
-              <a:latin typeface="Arial"/>
-              <a:cs typeface="Arial"/>
-            </a:endParaRPr>
-          </a:p>
-          <a:p>
-            <a:pPr>
-              <a:lnSpc>
-                <a:spcPct val="70000"/>
-              </a:lnSpc>
-              <a:buNone/>
-            </a:pPr>
-            <a:endParaRPr lang="en-GB" sz="1800" dirty="0">
-              <a:latin typeface="Arial"/>
-              <a:cs typeface="Arial"/>
-            </a:endParaRPr>
-          </a:p>
-          <a:p>
-            <a:pPr>
-              <a:lnSpc>
-                <a:spcPct val="70000"/>
-              </a:lnSpc>
-              <a:buNone/>
-            </a:pPr>
-            <a:r>
-              <a:rPr lang="en-GB" sz="1800" dirty="0">
+                <a:ea typeface="Calibri"/>
+                <a:cs typeface="Calibri"/>
+              </a:rPr>
+              <a:t> Web Applications</a:t>
+            </a:r>
+          </a:p>
+          <a:p>
+            <a:r>
+              <a:rPr lang="en-GB" sz="2000" dirty="0">
                 <a:solidFill>
                   <a:schemeClr val="bg1"/>
                 </a:solidFill>
                 <a:latin typeface="Arial"/>
-                <a:ea typeface="+mn-lt"/>
-                <a:cs typeface="+mn-lt"/>
-              </a:rPr>
-              <a:t>export default HelloWorld;</a:t>
-            </a:r>
-            <a:endParaRPr lang="en-GB" sz="1800" dirty="0">
-              <a:solidFill>
-                <a:schemeClr val="bg1"/>
-              </a:solidFill>
-              <a:latin typeface="Arial"/>
-              <a:cs typeface="Arial"/>
-            </a:endParaRPr>
-          </a:p>
-          <a:p>
-            <a:pPr>
-              <a:buNone/>
-            </a:pPr>
-            <a:endParaRPr lang="en-GB" sz="1800" dirty="0">
-              <a:solidFill>
-                <a:schemeClr val="bg1"/>
-              </a:solidFill>
-              <a:latin typeface="Arial"/>
-              <a:cs typeface="Calibri"/>
-            </a:endParaRPr>
+                <a:ea typeface="Calibri"/>
+                <a:cs typeface="Calibri"/>
+              </a:rPr>
+              <a:t>React DOM</a:t>
+            </a:r>
+          </a:p>
+          <a:p>
+            <a:r>
+              <a:rPr lang="en-GB" sz="2000" dirty="0">
+                <a:solidFill>
+                  <a:schemeClr val="bg1"/>
+                </a:solidFill>
+                <a:latin typeface="Arial"/>
+                <a:ea typeface="Calibri"/>
+                <a:cs typeface="Calibri"/>
+              </a:rPr>
+              <a:t>Environmental Setup</a:t>
+            </a:r>
+          </a:p>
+          <a:p>
+            <a:r>
+              <a:rPr lang="en-GB" sz="2000" dirty="0">
+                <a:solidFill>
+                  <a:schemeClr val="bg1"/>
+                </a:solidFill>
+                <a:latin typeface="Arial"/>
+                <a:ea typeface="Calibri"/>
+                <a:cs typeface="Calibri"/>
+              </a:rPr>
+              <a:t>NPM commands</a:t>
+            </a:r>
+          </a:p>
+          <a:p>
+            <a:r>
+              <a:rPr lang="en-GB" sz="2000" dirty="0">
+                <a:solidFill>
+                  <a:schemeClr val="bg1"/>
+                </a:solidFill>
+                <a:latin typeface="Arial"/>
+                <a:ea typeface="Calibri"/>
+                <a:cs typeface="Calibri"/>
+              </a:rPr>
+              <a:t>Overview of webpack</a:t>
+            </a:r>
+          </a:p>
+          <a:p>
+            <a:r>
+              <a:rPr lang="en-GB" sz="2000" dirty="0">
+                <a:solidFill>
+                  <a:schemeClr val="bg1"/>
+                </a:solidFill>
+                <a:latin typeface="Arial"/>
+                <a:ea typeface="Calibri"/>
+                <a:cs typeface="Calibri"/>
+              </a:rPr>
+              <a:t>Babel</a:t>
+            </a:r>
+          </a:p>
+          <a:p>
+            <a:r>
+              <a:rPr lang="en-GB" sz="2000" dirty="0">
+                <a:solidFill>
+                  <a:schemeClr val="bg1"/>
+                </a:solidFill>
+                <a:latin typeface="Arial"/>
+                <a:ea typeface="Calibri"/>
+                <a:cs typeface="Calibri"/>
+              </a:rPr>
+              <a:t>React Component</a:t>
+            </a:r>
+          </a:p>
+          <a:p>
+            <a:r>
+              <a:rPr lang="en-GB" sz="2000" dirty="0">
+                <a:solidFill>
+                  <a:schemeClr val="bg1"/>
+                </a:solidFill>
+                <a:latin typeface="Arial"/>
+                <a:ea typeface="Calibri"/>
+                <a:cs typeface="Calibri"/>
+              </a:rPr>
+              <a:t>Limitations of JSX</a:t>
+            </a:r>
           </a:p>
         </p:txBody>
       </p:sp>
       <p:sp>
         <p:nvSpPr>
-          <p:cNvPr id="30" name="Rectangle 29">
+          <p:cNvPr id="41" name="Rectangle 40">
             <a:extLst>
               <a:ext uri="{FF2B5EF4-FFF2-40B4-BE49-F238E27FC236}">
                 <a16:creationId xmlns:a16="http://schemas.microsoft.com/office/drawing/2014/main" id="{9DD005C1-8C51-42D6-9BEE-B9B83849743D}"/>
@@ -9246,7 +10503,7 @@
     </p:spTree>
     <p:extLst>
       <p:ext uri="{BB962C8B-B14F-4D97-AF65-F5344CB8AC3E}">
-        <p14:creationId xmlns:p14="http://schemas.microsoft.com/office/powerpoint/2010/main" val="768529477"/>
+        <p14:creationId xmlns:p14="http://schemas.microsoft.com/office/powerpoint/2010/main" val="1756907565"/>
       </p:ext>
     </p:extLst>
   </p:cSld>
@@ -9256,7 +10513,7 @@
 </p:sld>
 </file>
 
-<file path=ppt/slides/slide19.xml><?xml version="1.0" encoding="utf-8"?>
+<file path=ppt/slides/slide20.xml><?xml version="1.0" encoding="utf-8"?>
 <p:sld xmlns:a="http://schemas.openxmlformats.org/drawingml/2006/main" xmlns:r="http://schemas.openxmlformats.org/officeDocument/2006/relationships" xmlns:p="http://schemas.openxmlformats.org/presentationml/2006/main">
   <p:cSld>
     <p:bg>
@@ -9283,10 +10540,10 @@
       </p:grpSpPr>
       <p:sp>
         <p:nvSpPr>
-          <p:cNvPr id="75" name="Rectangle 74">
+          <p:cNvPr id="26" name="Rectangle 25">
             <a:extLst>
               <a:ext uri="{FF2B5EF4-FFF2-40B4-BE49-F238E27FC236}">
-                <a16:creationId xmlns:a16="http://schemas.microsoft.com/office/drawing/2014/main" id="{375B19E4-0108-41C4-8DB1-11BAE0B49D9B}"/>
+                <a16:creationId xmlns:a16="http://schemas.microsoft.com/office/drawing/2014/main" id="{B250C39F-3F6C-4D53-86D2-7BC6B2FF609C}"/>
               </a:ext>
               <a:ext uri="{C183D7F6-B498-43B3-948B-1728B52AA6E4}">
                 <adec:decorative xmlns:adec="http://schemas.microsoft.com/office/drawing/2017/decorative" val="1"/>
@@ -9343,453 +10600,7 @@
           <a:lstStyle/>
           <a:p>
             <a:pPr algn="ctr"/>
-            <a:endParaRPr lang="en-US" dirty="0">
-              <a:solidFill>
-                <a:schemeClr val="bg1"/>
-              </a:solidFill>
-            </a:endParaRPr>
-          </a:p>
-        </p:txBody>
-      </p:sp>
-      <p:sp>
-        <p:nvSpPr>
-          <p:cNvPr id="2" name="Title 1">
-            <a:extLst>
-              <a:ext uri="{FF2B5EF4-FFF2-40B4-BE49-F238E27FC236}">
-                <a16:creationId xmlns:a16="http://schemas.microsoft.com/office/drawing/2014/main" id="{0833764A-6054-E198-9B9B-D9EBC1F4D245}"/>
-              </a:ext>
-            </a:extLst>
-          </p:cNvPr>
-          <p:cNvSpPr>
-            <a:spLocks noGrp="1"/>
-          </p:cNvSpPr>
-          <p:nvPr>
-            <p:ph type="title"/>
-          </p:nvPr>
-        </p:nvSpPr>
-        <p:spPr>
-          <a:xfrm>
-            <a:off x="1295398" y="669925"/>
-            <a:ext cx="4686295" cy="1325563"/>
-          </a:xfrm>
-        </p:spPr>
-        <p:txBody>
-          <a:bodyPr anchor="b">
-            <a:normAutofit/>
-          </a:bodyPr>
-          <a:lstStyle/>
-          <a:p>
-            <a:r>
-              <a:rPr lang="en-GB" sz="3800">
-                <a:solidFill>
-                  <a:schemeClr val="bg1"/>
-                </a:solidFill>
-                <a:cs typeface="Calibri Light"/>
-              </a:rPr>
-              <a:t>Limitations of JSX</a:t>
-            </a:r>
-          </a:p>
-        </p:txBody>
-      </p:sp>
-      <p:sp>
-        <p:nvSpPr>
-          <p:cNvPr id="3" name="Content Placeholder 2">
-            <a:extLst>
-              <a:ext uri="{FF2B5EF4-FFF2-40B4-BE49-F238E27FC236}">
-                <a16:creationId xmlns:a16="http://schemas.microsoft.com/office/drawing/2014/main" id="{BF6387C6-3A3A-ED00-D649-6CCE37F720FD}"/>
-              </a:ext>
-            </a:extLst>
-          </p:cNvPr>
-          <p:cNvSpPr>
-            <a:spLocks noGrp="1"/>
-          </p:cNvSpPr>
-          <p:nvPr>
-            <p:ph idx="1"/>
-          </p:nvPr>
-        </p:nvSpPr>
-        <p:spPr>
-          <a:xfrm>
-            <a:off x="1295398" y="2350698"/>
-            <a:ext cx="7296550" cy="3466011"/>
-          </a:xfrm>
-        </p:spPr>
-        <p:txBody>
-          <a:bodyPr vert="horz" lIns="91440" tIns="45720" rIns="91440" bIns="45720" rtlCol="0" anchor="t">
-            <a:noAutofit/>
-          </a:bodyPr>
-          <a:lstStyle/>
-          <a:p>
-            <a:pPr marL="342900" indent="-342900">
-              <a:buAutoNum type="arabicPeriod"/>
-            </a:pPr>
-            <a:r>
-              <a:rPr lang="en-GB" sz="1600" dirty="0">
-                <a:solidFill>
-                  <a:schemeClr val="bg1"/>
-                </a:solidFill>
-                <a:latin typeface="Arial"/>
-                <a:ea typeface="+mn-lt"/>
-                <a:cs typeface="+mn-lt"/>
-              </a:rPr>
-              <a:t>JSX requires compilation before running in the browser.</a:t>
-            </a:r>
-            <a:endParaRPr lang="en-US" sz="1600">
-              <a:solidFill>
-                <a:schemeClr val="bg1"/>
-              </a:solidFill>
-              <a:latin typeface="Arial"/>
-              <a:cs typeface="Arial"/>
-            </a:endParaRPr>
-          </a:p>
-          <a:p>
-            <a:pPr marL="342900" indent="-342900">
-              <a:buAutoNum type="arabicPeriod"/>
-            </a:pPr>
-            <a:r>
-              <a:rPr lang="en-GB" sz="1600" dirty="0">
-                <a:solidFill>
-                  <a:schemeClr val="bg1"/>
-                </a:solidFill>
-                <a:latin typeface="Arial"/>
-                <a:ea typeface="+mn-lt"/>
-                <a:cs typeface="+mn-lt"/>
-              </a:rPr>
-              <a:t>Complex logic and control structures can make JSX code verbose and harder to read.</a:t>
-            </a:r>
-            <a:endParaRPr lang="en-GB" sz="1600">
-              <a:solidFill>
-                <a:schemeClr val="bg1"/>
-              </a:solidFill>
-              <a:latin typeface="Arial"/>
-              <a:cs typeface="Arial"/>
-            </a:endParaRPr>
-          </a:p>
-          <a:p>
-            <a:pPr>
-              <a:buNone/>
-            </a:pPr>
-            <a:r>
-              <a:rPr lang="en-GB" sz="1600" b="1" dirty="0">
-                <a:solidFill>
-                  <a:schemeClr val="bg1"/>
-                </a:solidFill>
-                <a:latin typeface="Arial"/>
-                <a:ea typeface="+mn-lt"/>
-                <a:cs typeface="+mn-lt"/>
-              </a:rPr>
-              <a:t>Important Points:</a:t>
-            </a:r>
-            <a:endParaRPr lang="en-GB" sz="1600">
-              <a:solidFill>
-                <a:schemeClr val="bg1"/>
-              </a:solidFill>
-              <a:latin typeface="Arial"/>
-              <a:cs typeface="Arial"/>
-            </a:endParaRPr>
-          </a:p>
-          <a:p>
-            <a:pPr>
-              <a:buFont typeface="Arial"/>
-              <a:buChar char="•"/>
-            </a:pPr>
-            <a:r>
-              <a:rPr lang="en-GB" sz="1600" dirty="0">
-                <a:solidFill>
-                  <a:schemeClr val="bg1"/>
-                </a:solidFill>
-                <a:latin typeface="Arial"/>
-                <a:ea typeface="+mn-lt"/>
-                <a:cs typeface="+mn-lt"/>
-              </a:rPr>
-              <a:t>Learning curve for newcomers.</a:t>
-            </a:r>
-            <a:endParaRPr lang="en-GB" sz="1600">
-              <a:solidFill>
-                <a:schemeClr val="bg1"/>
-              </a:solidFill>
-              <a:latin typeface="Arial"/>
-              <a:cs typeface="Arial"/>
-            </a:endParaRPr>
-          </a:p>
-          <a:p>
-            <a:pPr>
-              <a:buFont typeface="Arial"/>
-              <a:buChar char="•"/>
-            </a:pPr>
-            <a:r>
-              <a:rPr lang="en-GB" sz="1600" dirty="0">
-                <a:solidFill>
-                  <a:schemeClr val="bg1"/>
-                </a:solidFill>
-                <a:latin typeface="Arial"/>
-                <a:ea typeface="+mn-lt"/>
-                <a:cs typeface="+mn-lt"/>
-              </a:rPr>
-              <a:t>No direct HTML comments; use </a:t>
-            </a:r>
-            <a:r>
-              <a:rPr lang="en-GB" sz="1600" b="1" dirty="0">
-                <a:solidFill>
-                  <a:schemeClr val="bg1"/>
-                </a:solidFill>
-                <a:latin typeface="Arial"/>
-                <a:ea typeface="+mn-lt"/>
-                <a:cs typeface="+mn-lt"/>
-              </a:rPr>
-              <a:t>{/* ... */}</a:t>
-            </a:r>
-            <a:r>
-              <a:rPr lang="en-GB" sz="1600" dirty="0">
-                <a:solidFill>
-                  <a:schemeClr val="bg1"/>
-                </a:solidFill>
-                <a:latin typeface="Arial"/>
-                <a:ea typeface="+mn-lt"/>
-                <a:cs typeface="+mn-lt"/>
-              </a:rPr>
-              <a:t>.</a:t>
-            </a:r>
-            <a:endParaRPr lang="en-GB" sz="1600">
-              <a:solidFill>
-                <a:schemeClr val="bg1"/>
-              </a:solidFill>
-              <a:latin typeface="Arial"/>
-              <a:cs typeface="Arial"/>
-            </a:endParaRPr>
-          </a:p>
-          <a:p>
-            <a:pPr>
-              <a:buFont typeface="Arial"/>
-              <a:buChar char="•"/>
-            </a:pPr>
-            <a:r>
-              <a:rPr lang="en-GB" sz="1600" dirty="0">
-                <a:solidFill>
-                  <a:schemeClr val="bg1"/>
-                </a:solidFill>
-                <a:latin typeface="Arial"/>
-                <a:ea typeface="+mn-lt"/>
-                <a:cs typeface="+mn-lt"/>
-              </a:rPr>
-              <a:t>Self-closing tags should include a trailing slash.</a:t>
-            </a:r>
-            <a:endParaRPr lang="en-GB" sz="1600">
-              <a:solidFill>
-                <a:schemeClr val="bg1"/>
-              </a:solidFill>
-              <a:latin typeface="Arial"/>
-              <a:cs typeface="Arial"/>
-            </a:endParaRPr>
-          </a:p>
-          <a:p>
-            <a:pPr>
-              <a:buFont typeface="Arial"/>
-              <a:buChar char="•"/>
-            </a:pPr>
-            <a:r>
-              <a:rPr lang="en-GB" sz="1600" dirty="0">
-                <a:solidFill>
-                  <a:schemeClr val="bg1"/>
-                </a:solidFill>
-                <a:latin typeface="Arial"/>
-                <a:ea typeface="+mn-lt"/>
-                <a:cs typeface="+mn-lt"/>
-              </a:rPr>
-              <a:t>Use </a:t>
-            </a:r>
-            <a:r>
-              <a:rPr lang="en-GB" sz="1600" b="1" dirty="0" err="1">
-                <a:solidFill>
-                  <a:schemeClr val="bg1"/>
-                </a:solidFill>
-                <a:latin typeface="Arial"/>
-                <a:ea typeface="+mn-lt"/>
-                <a:cs typeface="+mn-lt"/>
-              </a:rPr>
-              <a:t>className</a:t>
-            </a:r>
-            <a:r>
-              <a:rPr lang="en-GB" sz="1600" dirty="0">
-                <a:solidFill>
-                  <a:schemeClr val="bg1"/>
-                </a:solidFill>
-                <a:latin typeface="Arial"/>
-                <a:ea typeface="+mn-lt"/>
-                <a:cs typeface="+mn-lt"/>
-              </a:rPr>
-              <a:t> for CSS classes.</a:t>
-            </a:r>
-            <a:endParaRPr lang="en-GB" sz="1600">
-              <a:solidFill>
-                <a:schemeClr val="bg1"/>
-              </a:solidFill>
-              <a:latin typeface="Arial"/>
-              <a:cs typeface="Arial"/>
-            </a:endParaRPr>
-          </a:p>
-          <a:p>
-            <a:pPr>
-              <a:buFont typeface="Arial"/>
-              <a:buChar char="•"/>
-            </a:pPr>
-            <a:r>
-              <a:rPr lang="en-GB" sz="1600" dirty="0">
-                <a:solidFill>
-                  <a:schemeClr val="bg1"/>
-                </a:solidFill>
-                <a:latin typeface="Arial"/>
-                <a:ea typeface="+mn-lt"/>
-                <a:cs typeface="+mn-lt"/>
-              </a:rPr>
-              <a:t>Wrapping elements in parentheses when multiple elements are returned.</a:t>
-            </a:r>
-            <a:endParaRPr lang="en-GB" sz="1600">
-              <a:solidFill>
-                <a:schemeClr val="bg1"/>
-              </a:solidFill>
-              <a:latin typeface="Arial"/>
-              <a:cs typeface="Arial"/>
-            </a:endParaRPr>
-          </a:p>
-          <a:p>
-            <a:pPr>
-              <a:buFont typeface="Arial"/>
-              <a:buChar char="•"/>
-            </a:pPr>
-            <a:r>
-              <a:rPr lang="en-GB" sz="1600" dirty="0">
-                <a:solidFill>
-                  <a:schemeClr val="bg1"/>
-                </a:solidFill>
-                <a:latin typeface="Arial"/>
-                <a:ea typeface="+mn-lt"/>
-                <a:cs typeface="+mn-lt"/>
-              </a:rPr>
-              <a:t>Potential naming conflicts with reserved words (e.g., </a:t>
-            </a:r>
-            <a:r>
-              <a:rPr lang="en-GB" sz="1600" b="1" dirty="0">
-                <a:solidFill>
-                  <a:schemeClr val="bg1"/>
-                </a:solidFill>
-                <a:latin typeface="Arial"/>
-                <a:ea typeface="+mn-lt"/>
-                <a:cs typeface="+mn-lt"/>
-              </a:rPr>
-              <a:t>class</a:t>
-            </a:r>
-            <a:r>
-              <a:rPr lang="en-GB" sz="1600" dirty="0">
-                <a:solidFill>
-                  <a:schemeClr val="bg1"/>
-                </a:solidFill>
-                <a:latin typeface="Arial"/>
-                <a:ea typeface="+mn-lt"/>
-                <a:cs typeface="+mn-lt"/>
-              </a:rPr>
-              <a:t> vs. </a:t>
-            </a:r>
-            <a:r>
-              <a:rPr lang="en-GB" sz="1600" b="1" dirty="0" err="1">
-                <a:solidFill>
-                  <a:schemeClr val="bg1"/>
-                </a:solidFill>
-                <a:latin typeface="Arial"/>
-                <a:ea typeface="+mn-lt"/>
-                <a:cs typeface="+mn-lt"/>
-              </a:rPr>
-              <a:t>className</a:t>
-            </a:r>
-            <a:r>
-              <a:rPr lang="en-GB" sz="1600" dirty="0">
-                <a:solidFill>
-                  <a:schemeClr val="bg1"/>
-                </a:solidFill>
-                <a:latin typeface="Arial"/>
-                <a:ea typeface="+mn-lt"/>
-                <a:cs typeface="+mn-lt"/>
-              </a:rPr>
-              <a:t>).</a:t>
-            </a:r>
-            <a:endParaRPr lang="en-GB" sz="1600">
-              <a:solidFill>
-                <a:schemeClr val="bg1"/>
-              </a:solidFill>
-              <a:latin typeface="Arial"/>
-              <a:cs typeface="Arial"/>
-            </a:endParaRPr>
-          </a:p>
-          <a:p>
-            <a:pPr>
-              <a:buFont typeface="Arial"/>
-              <a:buChar char="•"/>
-            </a:pPr>
-            <a:r>
-              <a:rPr lang="en-GB" sz="1600" dirty="0">
-                <a:solidFill>
-                  <a:schemeClr val="bg1"/>
-                </a:solidFill>
-                <a:latin typeface="Arial"/>
-                <a:ea typeface="+mn-lt"/>
-                <a:cs typeface="+mn-lt"/>
-              </a:rPr>
-              <a:t>Not enforcing accessibility; developers need to ensure accessibility manually.</a:t>
-            </a:r>
-            <a:endParaRPr lang="en-GB" sz="1600">
-              <a:solidFill>
-                <a:schemeClr val="bg1"/>
-              </a:solidFill>
-              <a:latin typeface="Arial"/>
-              <a:cs typeface="Arial"/>
-            </a:endParaRPr>
-          </a:p>
-          <a:p>
-            <a:pPr>
-              <a:buFont typeface="Arial"/>
-              <a:buChar char="•"/>
-            </a:pPr>
-            <a:r>
-              <a:rPr lang="en-GB" sz="1600" dirty="0">
-                <a:solidFill>
-                  <a:schemeClr val="bg1"/>
-                </a:solidFill>
-                <a:latin typeface="Arial"/>
-                <a:ea typeface="+mn-lt"/>
-                <a:cs typeface="+mn-lt"/>
-              </a:rPr>
-              <a:t>JSX is primarily used with React for UI development.</a:t>
-            </a:r>
-            <a:endParaRPr lang="en-GB" sz="1600">
-              <a:solidFill>
-                <a:schemeClr val="bg1"/>
-              </a:solidFill>
-              <a:latin typeface="Arial"/>
-              <a:cs typeface="Arial"/>
-            </a:endParaRPr>
-          </a:p>
-          <a:p>
-            <a:pPr marL="0" indent="0">
-              <a:buNone/>
-            </a:pPr>
-            <a:endParaRPr lang="en-GB" sz="1600" dirty="0">
-              <a:solidFill>
-                <a:schemeClr val="bg1"/>
-              </a:solidFill>
-              <a:latin typeface="Arial"/>
-              <a:cs typeface="Calibri"/>
-            </a:endParaRPr>
-          </a:p>
-          <a:p>
-            <a:pPr>
-              <a:buNone/>
-            </a:pPr>
-            <a:endParaRPr lang="en-GB" sz="1600" dirty="0">
-              <a:solidFill>
-                <a:schemeClr val="bg1"/>
-              </a:solidFill>
-              <a:latin typeface="Arial"/>
-              <a:cs typeface="Calibri"/>
-            </a:endParaRPr>
+            <a:endParaRPr lang="en-US" dirty="0"/>
           </a:p>
         </p:txBody>
       </p:sp>
@@ -9814,245 +10625,8 @@
         </p:blipFill>
         <p:spPr>
           <a:xfrm>
-            <a:off x="8781642" y="4627081"/>
-            <a:ext cx="3961592" cy="2230918"/>
-          </a:xfrm>
-          <a:prstGeom prst="rect">
-            <a:avLst/>
-          </a:prstGeom>
-        </p:spPr>
-      </p:pic>
-      <p:cxnSp>
-        <p:nvCxnSpPr>
-          <p:cNvPr id="76" name="Straight Connector 75">
-            <a:extLst>
-              <a:ext uri="{FF2B5EF4-FFF2-40B4-BE49-F238E27FC236}">
-                <a16:creationId xmlns:a16="http://schemas.microsoft.com/office/drawing/2014/main" id="{C727A21A-62F5-405C-B7A5-439FD3993289}"/>
-              </a:ext>
-              <a:ext uri="{C183D7F6-B498-43B3-948B-1728B52AA6E4}">
-                <adec:decorative xmlns:adec="http://schemas.microsoft.com/office/drawing/2017/decorative" val="1"/>
-              </a:ext>
-            </a:extLst>
-          </p:cNvPr>
-          <p:cNvCxnSpPr>
-            <a:cxnSpLocks noGrp="1" noRot="1" noChangeAspect="1" noMove="1" noResize="1" noEditPoints="1" noAdjustHandles="1" noChangeArrowheads="1" noChangeShapeType="1"/>
-          </p:cNvCxnSpPr>
-          <p:nvPr>
-            <p:extLst>
-              <p:ext uri="{386F3935-93C4-4BCD-93E2-E3B085C9AB24}">
-                <p16:designElem xmlns:p16="http://schemas.microsoft.com/office/powerpoint/2015/main" val="1"/>
-              </p:ext>
-            </p:extLst>
-          </p:nvPr>
-        </p:nvCxnSpPr>
-        <p:spPr>
-          <a:xfrm>
-            <a:off x="11829053" y="0"/>
-            <a:ext cx="0" cy="6858000"/>
-          </a:xfrm>
-          <a:prstGeom prst="line">
-            <a:avLst/>
-          </a:prstGeom>
-          <a:ln w="12700">
-            <a:solidFill>
-              <a:schemeClr val="accent2"/>
-            </a:solidFill>
-          </a:ln>
-        </p:spPr>
-        <p:style>
-          <a:lnRef idx="1">
-            <a:schemeClr val="accent1"/>
-          </a:lnRef>
-          <a:fillRef idx="0">
-            <a:schemeClr val="accent1"/>
-          </a:fillRef>
-          <a:effectRef idx="0">
-            <a:schemeClr val="accent1"/>
-          </a:effectRef>
-          <a:fontRef idx="minor">
-            <a:schemeClr val="tx1"/>
-          </a:fontRef>
-        </p:style>
-      </p:cxnSp>
-      <p:cxnSp>
-        <p:nvCxnSpPr>
-          <p:cNvPr id="77" name="Straight Connector 76">
-            <a:extLst>
-              <a:ext uri="{FF2B5EF4-FFF2-40B4-BE49-F238E27FC236}">
-                <a16:creationId xmlns:a16="http://schemas.microsoft.com/office/drawing/2014/main" id="{F641577A-888F-4E56-B9E4-CC57AC7B7BDB}"/>
-              </a:ext>
-              <a:ext uri="{C183D7F6-B498-43B3-948B-1728B52AA6E4}">
-                <adec:decorative xmlns:adec="http://schemas.microsoft.com/office/drawing/2017/decorative" val="1"/>
-              </a:ext>
-            </a:extLst>
-          </p:cNvPr>
-          <p:cNvCxnSpPr>
-            <a:cxnSpLocks noGrp="1" noRot="1" noChangeAspect="1" noMove="1" noResize="1" noEditPoints="1" noAdjustHandles="1" noChangeArrowheads="1" noChangeShapeType="1"/>
-          </p:cNvCxnSpPr>
-          <p:nvPr>
-            <p:extLst>
-              <p:ext uri="{386F3935-93C4-4BCD-93E2-E3B085C9AB24}">
-                <p16:designElem xmlns:p16="http://schemas.microsoft.com/office/powerpoint/2015/main" val="1"/>
-              </p:ext>
-            </p:extLst>
-          </p:nvPr>
-        </p:nvCxnSpPr>
-        <p:spPr>
-          <a:xfrm flipH="1">
-            <a:off x="1295399" y="2026340"/>
-            <a:ext cx="10896601" cy="0"/>
-          </a:xfrm>
-          <a:prstGeom prst="line">
-            <a:avLst/>
-          </a:prstGeom>
-          <a:ln w="12700">
-            <a:solidFill>
-              <a:schemeClr val="accent2"/>
-            </a:solidFill>
-          </a:ln>
-        </p:spPr>
-        <p:style>
-          <a:lnRef idx="1">
-            <a:schemeClr val="accent1"/>
-          </a:lnRef>
-          <a:fillRef idx="0">
-            <a:schemeClr val="accent1"/>
-          </a:fillRef>
-          <a:effectRef idx="0">
-            <a:schemeClr val="accent1"/>
-          </a:effectRef>
-          <a:fontRef idx="minor">
-            <a:schemeClr val="tx1"/>
-          </a:fontRef>
-        </p:style>
-      </p:cxnSp>
-    </p:spTree>
-    <p:extLst>
-      <p:ext uri="{BB962C8B-B14F-4D97-AF65-F5344CB8AC3E}">
-        <p14:creationId xmlns:p14="http://schemas.microsoft.com/office/powerpoint/2010/main" val="2053485375"/>
-      </p:ext>
-    </p:extLst>
-  </p:cSld>
-  <p:clrMapOvr>
-    <a:masterClrMapping/>
-  </p:clrMapOvr>
-</p:sld>
-</file>
-
-<file path=ppt/slides/slide2.xml><?xml version="1.0" encoding="utf-8"?>
-<p:sld xmlns:a="http://schemas.openxmlformats.org/drawingml/2006/main" xmlns:r="http://schemas.openxmlformats.org/officeDocument/2006/relationships" xmlns:p="http://schemas.openxmlformats.org/presentationml/2006/main">
-  <p:cSld>
-    <p:bg>
-      <p:bgPr>
-        <a:solidFill>
-          <a:schemeClr val="bg1"/>
-        </a:solidFill>
-        <a:effectLst/>
-      </p:bgPr>
-    </p:bg>
-    <p:spTree>
-      <p:nvGrpSpPr>
-        <p:cNvPr id="1" name=""/>
-        <p:cNvGrpSpPr/>
-        <p:nvPr/>
-      </p:nvGrpSpPr>
-      <p:grpSpPr>
-        <a:xfrm>
-          <a:off x="0" y="0"/>
-          <a:ext cx="0" cy="0"/>
-          <a:chOff x="0" y="0"/>
-          <a:chExt cx="0" cy="0"/>
-        </a:xfrm>
-      </p:grpSpPr>
-      <p:sp>
-        <p:nvSpPr>
-          <p:cNvPr id="37" name="Rectangle 36">
-            <a:extLst>
-              <a:ext uri="{FF2B5EF4-FFF2-40B4-BE49-F238E27FC236}">
-                <a16:creationId xmlns:a16="http://schemas.microsoft.com/office/drawing/2014/main" id="{B250C39F-3F6C-4D53-86D2-7BC6B2FF609C}"/>
-              </a:ext>
-              <a:ext uri="{C183D7F6-B498-43B3-948B-1728B52AA6E4}">
-                <adec:decorative xmlns:adec="http://schemas.microsoft.com/office/drawing/2017/decorative" val="1"/>
-              </a:ext>
-            </a:extLst>
-          </p:cNvPr>
-          <p:cNvSpPr>
-            <a:spLocks noGrp="1" noRot="1" noChangeAspect="1" noMove="1" noResize="1" noEditPoints="1" noAdjustHandles="1" noChangeArrowheads="1" noChangeShapeType="1" noTextEdit="1"/>
-          </p:cNvSpPr>
-          <p:nvPr>
-            <p:extLst>
-              <p:ext uri="{386F3935-93C4-4BCD-93E2-E3B085C9AB24}">
-                <p16:designElem xmlns:p16="http://schemas.microsoft.com/office/powerpoint/2015/main" val="1"/>
-              </p:ext>
-            </p:extLst>
-          </p:nvPr>
-        </p:nvSpPr>
-        <p:spPr>
-          <a:xfrm>
-            <a:off x="0" y="0"/>
-            <a:ext cx="12192000" cy="6858000"/>
-          </a:xfrm>
-          <a:prstGeom prst="rect">
-            <a:avLst/>
-          </a:prstGeom>
-          <a:solidFill>
-            <a:schemeClr val="tx1">
-              <a:lumMod val="95000"/>
-              <a:lumOff val="5000"/>
-            </a:schemeClr>
-          </a:solidFill>
-          <a:ln>
-            <a:noFill/>
-          </a:ln>
-        </p:spPr>
-        <p:style>
-          <a:lnRef idx="2">
-            <a:schemeClr val="accent1">
-              <a:shade val="50000"/>
-            </a:schemeClr>
-          </a:lnRef>
-          <a:fillRef idx="1">
-            <a:schemeClr val="accent1"/>
-          </a:fillRef>
-          <a:effectRef idx="0">
-            <a:schemeClr val="accent1"/>
-          </a:effectRef>
-          <a:fontRef idx="minor">
-            <a:schemeClr val="lt1"/>
-          </a:fontRef>
-        </p:style>
-        <p:txBody>
-          <a:bodyPr rtlCol="0" anchor="ctr"/>
-          <a:lstStyle/>
-          <a:p>
-            <a:pPr algn="ctr"/>
-            <a:endParaRPr lang="en-US" dirty="0"/>
-          </a:p>
-        </p:txBody>
-      </p:sp>
-      <p:pic>
-        <p:nvPicPr>
-          <p:cNvPr id="4" name="Picture 3" descr="A cartoon character holding a notebook&#10;&#10;Description automatically generated">
-            <a:extLst>
-              <a:ext uri="{FF2B5EF4-FFF2-40B4-BE49-F238E27FC236}">
-                <a16:creationId xmlns:a16="http://schemas.microsoft.com/office/drawing/2014/main" id="{FFAFD5CF-45DC-0120-1519-A4DD0C9F8F39}"/>
-              </a:ext>
-            </a:extLst>
-          </p:cNvPr>
-          <p:cNvPicPr>
-            <a:picLocks noChangeAspect="1"/>
-          </p:cNvPicPr>
-          <p:nvPr/>
-        </p:nvPicPr>
-        <p:blipFill rotWithShape="1">
-          <a:blip r:embed="rId2"/>
-          <a:srcRect t="16784" b="37794"/>
-          <a:stretch/>
-        </p:blipFill>
-        <p:spPr>
-          <a:xfrm>
-            <a:off x="5155680" y="907925"/>
-            <a:ext cx="9160193" cy="5155650"/>
+            <a:off x="20" y="10"/>
+            <a:ext cx="12191980" cy="6857990"/>
           </a:xfrm>
           <a:prstGeom prst="rect">
             <a:avLst/>
@@ -10061,7 +10635,7 @@
       </p:pic>
       <p:sp>
         <p:nvSpPr>
-          <p:cNvPr id="39" name="Rectangle 38">
+          <p:cNvPr id="28" name="Rectangle 27">
             <a:extLst>
               <a:ext uri="{FF2B5EF4-FFF2-40B4-BE49-F238E27FC236}">
                 <a16:creationId xmlns:a16="http://schemas.microsoft.com/office/drawing/2014/main" id="{70A48D59-8581-41F7-B529-F4617FE07A9A}"/>
@@ -10142,7 +10716,7 @@
           <p:cNvPr id="2" name="Title 1">
             <a:extLst>
               <a:ext uri="{FF2B5EF4-FFF2-40B4-BE49-F238E27FC236}">
-                <a16:creationId xmlns:a16="http://schemas.microsoft.com/office/drawing/2014/main" id="{F79E16CB-DAC4-717E-0E7D-DD909F18D66F}"/>
+                <a16:creationId xmlns:a16="http://schemas.microsoft.com/office/drawing/2014/main" id="{0833764A-6054-E198-9B9B-D9EBC1F4D245}"/>
               </a:ext>
             </a:extLst>
           </p:cNvPr>
@@ -10155,7 +10729,7 @@
         </p:nvSpPr>
         <p:spPr>
           <a:xfrm>
-            <a:off x="1104900" y="-127186"/>
+            <a:off x="1104900" y="910431"/>
             <a:ext cx="4724400" cy="1466455"/>
           </a:xfrm>
         </p:spPr>
@@ -10170,16 +10744,10 @@
                 <a:solidFill>
                   <a:schemeClr val="bg1"/>
                 </a:solidFill>
-                <a:ea typeface="Calibri Light"/>
                 <a:cs typeface="Calibri Light"/>
               </a:rPr>
-              <a:t>Agenda</a:t>
-            </a:r>
-            <a:endParaRPr lang="en-GB">
-              <a:solidFill>
-                <a:schemeClr val="bg1"/>
-              </a:solidFill>
-            </a:endParaRPr>
+              <a:t>Example</a:t>
+            </a:r>
           </a:p>
         </p:txBody>
       </p:sp>
@@ -10188,7 +10756,7 @@
           <p:cNvPr id="3" name="Content Placeholder 2">
             <a:extLst>
               <a:ext uri="{FF2B5EF4-FFF2-40B4-BE49-F238E27FC236}">
-                <a16:creationId xmlns:a16="http://schemas.microsoft.com/office/drawing/2014/main" id="{6BC158D1-70BE-32F3-7EAB-1E4704A43B35}"/>
+                <a16:creationId xmlns:a16="http://schemas.microsoft.com/office/drawing/2014/main" id="{BF6387C6-3A3A-ED00-D649-6CCE37F720FD}"/>
               </a:ext>
             </a:extLst>
           </p:cNvPr>
@@ -10201,185 +10769,238 @@
         </p:nvSpPr>
         <p:spPr>
           <a:xfrm>
-            <a:off x="1104900" y="1486888"/>
-            <a:ext cx="4724400" cy="3015849"/>
+            <a:off x="1104900" y="2702846"/>
+            <a:ext cx="5081080" cy="3242827"/>
           </a:xfrm>
         </p:spPr>
         <p:txBody>
           <a:bodyPr vert="horz" lIns="91440" tIns="45720" rIns="91440" bIns="45720" rtlCol="0" anchor="t">
-            <a:noAutofit/>
+            <a:normAutofit/>
           </a:bodyPr>
           <a:lstStyle/>
           <a:p>
-            <a:r>
-              <a:rPr lang="en-GB" sz="2000" dirty="0">
+            <a:pPr>
+              <a:lnSpc>
+                <a:spcPct val="70000"/>
+              </a:lnSpc>
+              <a:buNone/>
+            </a:pPr>
+            <a:r>
+              <a:rPr lang="en-GB" sz="1800" dirty="0">
                 <a:solidFill>
                   <a:schemeClr val="bg1"/>
                 </a:solidFill>
                 <a:latin typeface="Arial"/>
-                <a:ea typeface="Calibri"/>
-                <a:cs typeface="Calibri"/>
-              </a:rPr>
-              <a:t>JavaScript Essentials</a:t>
-            </a:r>
-          </a:p>
-          <a:p>
-            <a:r>
-              <a:rPr lang="en-GB" sz="2000" dirty="0">
+                <a:ea typeface="+mn-lt"/>
+                <a:cs typeface="+mn-lt"/>
+              </a:rPr>
+              <a:t>import React, { Component } from 'react';</a:t>
+            </a:r>
+            <a:endParaRPr lang="en-US" sz="1800">
+              <a:solidFill>
+                <a:schemeClr val="bg1"/>
+              </a:solidFill>
+              <a:latin typeface="Arial"/>
+              <a:cs typeface="Arial"/>
+            </a:endParaRPr>
+          </a:p>
+          <a:p>
+            <a:pPr>
+              <a:lnSpc>
+                <a:spcPct val="70000"/>
+              </a:lnSpc>
+              <a:buNone/>
+            </a:pPr>
+            <a:endParaRPr lang="en-GB" sz="1800" dirty="0">
+              <a:latin typeface="Arial"/>
+              <a:cs typeface="Arial"/>
+            </a:endParaRPr>
+          </a:p>
+          <a:p>
+            <a:pPr>
+              <a:lnSpc>
+                <a:spcPct val="70000"/>
+              </a:lnSpc>
+              <a:buNone/>
+            </a:pPr>
+            <a:r>
+              <a:rPr lang="en-GB" sz="1800" dirty="0">
                 <a:solidFill>
                   <a:schemeClr val="bg1"/>
                 </a:solidFill>
                 <a:latin typeface="Arial"/>
-                <a:ea typeface="Calibri"/>
-                <a:cs typeface="Calibri"/>
-              </a:rPr>
-              <a:t>Event loop</a:t>
-            </a:r>
-          </a:p>
-          <a:p>
-            <a:r>
-              <a:rPr lang="en-GB" sz="2000" dirty="0">
+                <a:ea typeface="+mn-lt"/>
+                <a:cs typeface="+mn-lt"/>
+              </a:rPr>
+              <a:t>class HelloWorld extends Component {</a:t>
+            </a:r>
+            <a:endParaRPr lang="en-GB" sz="1800">
+              <a:solidFill>
+                <a:schemeClr val="bg1"/>
+              </a:solidFill>
+              <a:latin typeface="Arial"/>
+              <a:cs typeface="Arial"/>
+            </a:endParaRPr>
+          </a:p>
+          <a:p>
+            <a:pPr>
+              <a:lnSpc>
+                <a:spcPct val="70000"/>
+              </a:lnSpc>
+              <a:buNone/>
+            </a:pPr>
+            <a:r>
+              <a:rPr lang="en-GB" sz="1800" dirty="0">
                 <a:solidFill>
                   <a:schemeClr val="bg1"/>
                 </a:solidFill>
                 <a:latin typeface="Arial"/>
-                <a:ea typeface="Calibri"/>
-                <a:cs typeface="Calibri"/>
-              </a:rPr>
-              <a:t>React JSX</a:t>
-            </a:r>
-          </a:p>
-          <a:p>
-            <a:r>
-              <a:rPr lang="en-GB" sz="2000" dirty="0">
+                <a:ea typeface="+mn-lt"/>
+                <a:cs typeface="+mn-lt"/>
+              </a:rPr>
+              <a:t>  render() {</a:t>
+            </a:r>
+            <a:endParaRPr lang="en-GB" sz="1800">
+              <a:solidFill>
+                <a:schemeClr val="bg1"/>
+              </a:solidFill>
+              <a:latin typeface="Arial"/>
+              <a:cs typeface="Arial"/>
+            </a:endParaRPr>
+          </a:p>
+          <a:p>
+            <a:pPr>
+              <a:lnSpc>
+                <a:spcPct val="70000"/>
+              </a:lnSpc>
+              <a:buNone/>
+            </a:pPr>
+            <a:r>
+              <a:rPr lang="en-GB" sz="1800" dirty="0">
                 <a:solidFill>
                   <a:schemeClr val="bg1"/>
                 </a:solidFill>
                 <a:latin typeface="Arial"/>
-                <a:ea typeface="Calibri"/>
-                <a:cs typeface="Calibri"/>
-              </a:rPr>
-              <a:t>Libraries for </a:t>
-            </a:r>
-            <a:r>
-              <a:rPr lang="en-GB" sz="2000" err="1">
+                <a:ea typeface="+mn-lt"/>
+                <a:cs typeface="+mn-lt"/>
+              </a:rPr>
+              <a:t>    return &lt;div&gt;Hello, World!&lt;/div&gt;;</a:t>
+            </a:r>
+            <a:endParaRPr lang="en-GB" sz="1800">
+              <a:solidFill>
+                <a:schemeClr val="bg1"/>
+              </a:solidFill>
+              <a:latin typeface="Arial"/>
+              <a:cs typeface="Arial"/>
+            </a:endParaRPr>
+          </a:p>
+          <a:p>
+            <a:pPr>
+              <a:lnSpc>
+                <a:spcPct val="70000"/>
+              </a:lnSpc>
+              <a:buNone/>
+            </a:pPr>
+            <a:r>
+              <a:rPr lang="en-GB" sz="1800" dirty="0">
                 <a:solidFill>
                   <a:schemeClr val="bg1"/>
                 </a:solidFill>
                 <a:latin typeface="Arial"/>
-                <a:ea typeface="Calibri"/>
-                <a:cs typeface="Calibri"/>
-              </a:rPr>
-              <a:t>ClientSide</a:t>
-            </a:r>
-            <a:r>
-              <a:rPr lang="en-GB" sz="2000" dirty="0">
+                <a:ea typeface="+mn-lt"/>
+                <a:cs typeface="+mn-lt"/>
+              </a:rPr>
+              <a:t>  }</a:t>
+            </a:r>
+            <a:endParaRPr lang="en-GB" sz="1800">
+              <a:solidFill>
+                <a:schemeClr val="bg1"/>
+              </a:solidFill>
+              <a:latin typeface="Arial"/>
+              <a:cs typeface="Arial"/>
+            </a:endParaRPr>
+          </a:p>
+          <a:p>
+            <a:pPr>
+              <a:lnSpc>
+                <a:spcPct val="70000"/>
+              </a:lnSpc>
+              <a:buNone/>
+            </a:pPr>
+            <a:r>
+              <a:rPr lang="en-GB" sz="1800" dirty="0">
                 <a:solidFill>
                   <a:schemeClr val="bg1"/>
                 </a:solidFill>
                 <a:latin typeface="Arial"/>
-                <a:ea typeface="Calibri"/>
-                <a:cs typeface="Calibri"/>
-              </a:rPr>
-              <a:t> Web Applications</a:t>
-            </a:r>
-          </a:p>
-          <a:p>
-            <a:r>
-              <a:rPr lang="en-GB" sz="2000" dirty="0">
+                <a:ea typeface="+mn-lt"/>
+                <a:cs typeface="+mn-lt"/>
+              </a:rPr>
+              <a:t>}</a:t>
+            </a:r>
+            <a:endParaRPr lang="en-GB" sz="1800">
+              <a:solidFill>
+                <a:schemeClr val="bg1"/>
+              </a:solidFill>
+              <a:latin typeface="Arial"/>
+              <a:cs typeface="Arial"/>
+            </a:endParaRPr>
+          </a:p>
+          <a:p>
+            <a:pPr>
+              <a:lnSpc>
+                <a:spcPct val="70000"/>
+              </a:lnSpc>
+              <a:buNone/>
+            </a:pPr>
+            <a:endParaRPr lang="en-GB" sz="1800" dirty="0">
+              <a:latin typeface="Arial"/>
+              <a:cs typeface="Arial"/>
+            </a:endParaRPr>
+          </a:p>
+          <a:p>
+            <a:pPr>
+              <a:lnSpc>
+                <a:spcPct val="70000"/>
+              </a:lnSpc>
+              <a:buNone/>
+            </a:pPr>
+            <a:r>
+              <a:rPr lang="en-GB" sz="1800" dirty="0">
                 <a:solidFill>
                   <a:schemeClr val="bg1"/>
                 </a:solidFill>
                 <a:latin typeface="Arial"/>
-                <a:ea typeface="Calibri"/>
-                <a:cs typeface="Calibri"/>
-              </a:rPr>
-              <a:t>React DOM</a:t>
-            </a:r>
-          </a:p>
-          <a:p>
-            <a:r>
-              <a:rPr lang="en-GB" sz="2000" dirty="0">
-                <a:solidFill>
-                  <a:schemeClr val="bg1"/>
-                </a:solidFill>
-                <a:latin typeface="Arial"/>
-                <a:ea typeface="Calibri"/>
-                <a:cs typeface="Calibri"/>
-              </a:rPr>
-              <a:t>Environmental Setup</a:t>
-            </a:r>
-          </a:p>
-          <a:p>
-            <a:r>
-              <a:rPr lang="en-GB" sz="2000" dirty="0">
-                <a:solidFill>
-                  <a:schemeClr val="bg1"/>
-                </a:solidFill>
-                <a:latin typeface="Arial"/>
-                <a:ea typeface="Calibri"/>
-                <a:cs typeface="Calibri"/>
-              </a:rPr>
-              <a:t>NPM commands</a:t>
-            </a:r>
-          </a:p>
-          <a:p>
-            <a:r>
-              <a:rPr lang="en-GB" sz="2000" dirty="0">
-                <a:solidFill>
-                  <a:schemeClr val="bg1"/>
-                </a:solidFill>
-                <a:latin typeface="Arial"/>
-                <a:ea typeface="Calibri"/>
-                <a:cs typeface="Calibri"/>
-              </a:rPr>
-              <a:t>Overview of webpack</a:t>
-            </a:r>
-          </a:p>
-          <a:p>
-            <a:r>
-              <a:rPr lang="en-GB" sz="2000" dirty="0">
-                <a:solidFill>
-                  <a:schemeClr val="bg1"/>
-                </a:solidFill>
-                <a:latin typeface="Arial"/>
-                <a:ea typeface="Calibri"/>
-                <a:cs typeface="Calibri"/>
-              </a:rPr>
-              <a:t>Babel</a:t>
-            </a:r>
-          </a:p>
-          <a:p>
-            <a:r>
-              <a:rPr lang="en-GB" sz="2000" dirty="0">
-                <a:solidFill>
-                  <a:schemeClr val="bg1"/>
-                </a:solidFill>
-                <a:latin typeface="Arial"/>
-                <a:ea typeface="Calibri"/>
-                <a:cs typeface="Calibri"/>
-              </a:rPr>
-              <a:t>React Component</a:t>
-            </a:r>
-          </a:p>
-          <a:p>
-            <a:r>
-              <a:rPr lang="en-GB" sz="2000" dirty="0">
-                <a:solidFill>
-                  <a:schemeClr val="bg1"/>
-                </a:solidFill>
-                <a:latin typeface="Arial"/>
-                <a:ea typeface="Calibri"/>
-                <a:cs typeface="Calibri"/>
-              </a:rPr>
-              <a:t>Limitations of JSX</a:t>
-            </a:r>
+                <a:ea typeface="+mn-lt"/>
+                <a:cs typeface="+mn-lt"/>
+              </a:rPr>
+              <a:t>export default HelloWorld;</a:t>
+            </a:r>
+            <a:endParaRPr lang="en-GB" sz="1800" dirty="0">
+              <a:solidFill>
+                <a:schemeClr val="bg1"/>
+              </a:solidFill>
+              <a:latin typeface="Arial"/>
+              <a:cs typeface="Arial"/>
+            </a:endParaRPr>
+          </a:p>
+          <a:p>
+            <a:pPr>
+              <a:buNone/>
+            </a:pPr>
+            <a:endParaRPr lang="en-GB" sz="1800" dirty="0">
+              <a:solidFill>
+                <a:schemeClr val="bg1"/>
+              </a:solidFill>
+              <a:latin typeface="Arial"/>
+              <a:cs typeface="Calibri"/>
+            </a:endParaRPr>
           </a:p>
         </p:txBody>
       </p:sp>
       <p:sp>
         <p:nvSpPr>
-          <p:cNvPr id="41" name="Rectangle 40">
+          <p:cNvPr id="30" name="Rectangle 29">
             <a:extLst>
               <a:ext uri="{FF2B5EF4-FFF2-40B4-BE49-F238E27FC236}">
                 <a16:creationId xmlns:a16="http://schemas.microsoft.com/office/drawing/2014/main" id="{9DD005C1-8C51-42D6-9BEE-B9B83849743D}"/>
@@ -10443,7 +11064,690 @@
     </p:spTree>
     <p:extLst>
       <p:ext uri="{BB962C8B-B14F-4D97-AF65-F5344CB8AC3E}">
-        <p14:creationId xmlns:p14="http://schemas.microsoft.com/office/powerpoint/2010/main" val="1756907565"/>
+        <p14:creationId xmlns:p14="http://schemas.microsoft.com/office/powerpoint/2010/main" val="768529477"/>
+      </p:ext>
+    </p:extLst>
+  </p:cSld>
+  <p:clrMapOvr>
+    <a:masterClrMapping/>
+  </p:clrMapOvr>
+</p:sld>
+</file>
+
+<file path=ppt/slides/slide21.xml><?xml version="1.0" encoding="utf-8"?>
+<p:sld xmlns:a="http://schemas.openxmlformats.org/drawingml/2006/main" xmlns:r="http://schemas.openxmlformats.org/officeDocument/2006/relationships" xmlns:p="http://schemas.openxmlformats.org/presentationml/2006/main">
+  <p:cSld>
+    <p:bg>
+      <p:bgPr>
+        <a:solidFill>
+          <a:schemeClr val="bg1"/>
+        </a:solidFill>
+        <a:effectLst/>
+      </p:bgPr>
+    </p:bg>
+    <p:spTree>
+      <p:nvGrpSpPr>
+        <p:cNvPr id="1" name=""/>
+        <p:cNvGrpSpPr/>
+        <p:nvPr/>
+      </p:nvGrpSpPr>
+      <p:grpSpPr>
+        <a:xfrm>
+          <a:off x="0" y="0"/>
+          <a:ext cx="0" cy="0"/>
+          <a:chOff x="0" y="0"/>
+          <a:chExt cx="0" cy="0"/>
+        </a:xfrm>
+      </p:grpSpPr>
+      <p:sp>
+        <p:nvSpPr>
+          <p:cNvPr id="75" name="Rectangle 74">
+            <a:extLst>
+              <a:ext uri="{FF2B5EF4-FFF2-40B4-BE49-F238E27FC236}">
+                <a16:creationId xmlns:a16="http://schemas.microsoft.com/office/drawing/2014/main" id="{375B19E4-0108-41C4-8DB1-11BAE0B49D9B}"/>
+              </a:ext>
+              <a:ext uri="{C183D7F6-B498-43B3-948B-1728B52AA6E4}">
+                <adec:decorative xmlns:adec="http://schemas.microsoft.com/office/drawing/2017/decorative" val="1"/>
+              </a:ext>
+            </a:extLst>
+          </p:cNvPr>
+          <p:cNvSpPr>
+            <a:spLocks noGrp="1" noRot="1" noChangeAspect="1" noMove="1" noResize="1" noEditPoints="1" noAdjustHandles="1" noChangeArrowheads="1" noChangeShapeType="1" noTextEdit="1"/>
+          </p:cNvSpPr>
+          <p:nvPr>
+            <p:extLst>
+              <p:ext uri="{386F3935-93C4-4BCD-93E2-E3B085C9AB24}">
+                <p16:designElem xmlns:p16="http://schemas.microsoft.com/office/powerpoint/2015/main" val="1"/>
+              </p:ext>
+            </p:extLst>
+          </p:nvPr>
+        </p:nvSpPr>
+        <p:spPr>
+          <a:xfrm>
+            <a:off x="0" y="0"/>
+            <a:ext cx="12192000" cy="6858000"/>
+          </a:xfrm>
+          <a:prstGeom prst="rect">
+            <a:avLst/>
+          </a:prstGeom>
+          <a:solidFill>
+            <a:schemeClr val="tx1">
+              <a:lumMod val="95000"/>
+              <a:lumOff val="5000"/>
+            </a:schemeClr>
+          </a:solidFill>
+          <a:ln>
+            <a:noFill/>
+          </a:ln>
+        </p:spPr>
+        <p:style>
+          <a:lnRef idx="2">
+            <a:schemeClr val="accent1">
+              <a:shade val="50000"/>
+            </a:schemeClr>
+          </a:lnRef>
+          <a:fillRef idx="1">
+            <a:schemeClr val="accent1"/>
+          </a:fillRef>
+          <a:effectRef idx="0">
+            <a:schemeClr val="accent1"/>
+          </a:effectRef>
+          <a:fontRef idx="minor">
+            <a:schemeClr val="lt1"/>
+          </a:fontRef>
+        </p:style>
+        <p:txBody>
+          <a:bodyPr rtlCol="0" anchor="ctr"/>
+          <a:lstStyle/>
+          <a:p>
+            <a:pPr algn="ctr"/>
+            <a:endParaRPr lang="en-US" dirty="0">
+              <a:solidFill>
+                <a:schemeClr val="bg1"/>
+              </a:solidFill>
+            </a:endParaRPr>
+          </a:p>
+        </p:txBody>
+      </p:sp>
+      <p:sp>
+        <p:nvSpPr>
+          <p:cNvPr id="2" name="Title 1">
+            <a:extLst>
+              <a:ext uri="{FF2B5EF4-FFF2-40B4-BE49-F238E27FC236}">
+                <a16:creationId xmlns:a16="http://schemas.microsoft.com/office/drawing/2014/main" id="{0833764A-6054-E198-9B9B-D9EBC1F4D245}"/>
+              </a:ext>
+            </a:extLst>
+          </p:cNvPr>
+          <p:cNvSpPr>
+            <a:spLocks noGrp="1"/>
+          </p:cNvSpPr>
+          <p:nvPr>
+            <p:ph type="title"/>
+          </p:nvPr>
+        </p:nvSpPr>
+        <p:spPr>
+          <a:xfrm>
+            <a:off x="1295398" y="669925"/>
+            <a:ext cx="4686295" cy="1325563"/>
+          </a:xfrm>
+        </p:spPr>
+        <p:txBody>
+          <a:bodyPr anchor="b">
+            <a:normAutofit/>
+          </a:bodyPr>
+          <a:lstStyle/>
+          <a:p>
+            <a:r>
+              <a:rPr lang="en-GB" sz="3800">
+                <a:solidFill>
+                  <a:schemeClr val="bg1"/>
+                </a:solidFill>
+                <a:cs typeface="Calibri Light"/>
+              </a:rPr>
+              <a:t>Limitations of JSX</a:t>
+            </a:r>
+          </a:p>
+        </p:txBody>
+      </p:sp>
+      <p:sp>
+        <p:nvSpPr>
+          <p:cNvPr id="3" name="Content Placeholder 2">
+            <a:extLst>
+              <a:ext uri="{FF2B5EF4-FFF2-40B4-BE49-F238E27FC236}">
+                <a16:creationId xmlns:a16="http://schemas.microsoft.com/office/drawing/2014/main" id="{BF6387C6-3A3A-ED00-D649-6CCE37F720FD}"/>
+              </a:ext>
+            </a:extLst>
+          </p:cNvPr>
+          <p:cNvSpPr>
+            <a:spLocks noGrp="1"/>
+          </p:cNvSpPr>
+          <p:nvPr>
+            <p:ph idx="1"/>
+          </p:nvPr>
+        </p:nvSpPr>
+        <p:spPr>
+          <a:xfrm>
+            <a:off x="1295398" y="2350698"/>
+            <a:ext cx="7296550" cy="3466011"/>
+          </a:xfrm>
+        </p:spPr>
+        <p:txBody>
+          <a:bodyPr vert="horz" lIns="91440" tIns="45720" rIns="91440" bIns="45720" rtlCol="0" anchor="t">
+            <a:noAutofit/>
+          </a:bodyPr>
+          <a:lstStyle/>
+          <a:p>
+            <a:pPr marL="342900" indent="-342900">
+              <a:buAutoNum type="arabicPeriod"/>
+            </a:pPr>
+            <a:r>
+              <a:rPr lang="en-GB" sz="1600" dirty="0">
+                <a:solidFill>
+                  <a:schemeClr val="bg1"/>
+                </a:solidFill>
+                <a:latin typeface="Arial"/>
+                <a:ea typeface="+mn-lt"/>
+                <a:cs typeface="+mn-lt"/>
+              </a:rPr>
+              <a:t>JSX requires compilation before running in the browser.</a:t>
+            </a:r>
+            <a:endParaRPr lang="en-US" sz="1600">
+              <a:solidFill>
+                <a:schemeClr val="bg1"/>
+              </a:solidFill>
+              <a:latin typeface="Arial"/>
+              <a:cs typeface="Arial"/>
+            </a:endParaRPr>
+          </a:p>
+          <a:p>
+            <a:pPr marL="342900" indent="-342900">
+              <a:buAutoNum type="arabicPeriod"/>
+            </a:pPr>
+            <a:r>
+              <a:rPr lang="en-GB" sz="1600" dirty="0">
+                <a:solidFill>
+                  <a:schemeClr val="bg1"/>
+                </a:solidFill>
+                <a:latin typeface="Arial"/>
+                <a:ea typeface="+mn-lt"/>
+                <a:cs typeface="+mn-lt"/>
+              </a:rPr>
+              <a:t>Complex logic and control structures can make JSX code verbose and harder to read.</a:t>
+            </a:r>
+            <a:endParaRPr lang="en-GB" sz="1600">
+              <a:solidFill>
+                <a:schemeClr val="bg1"/>
+              </a:solidFill>
+              <a:latin typeface="Arial"/>
+              <a:cs typeface="Arial"/>
+            </a:endParaRPr>
+          </a:p>
+          <a:p>
+            <a:pPr>
+              <a:buNone/>
+            </a:pPr>
+            <a:r>
+              <a:rPr lang="en-GB" sz="1600" b="1" dirty="0">
+                <a:solidFill>
+                  <a:schemeClr val="bg1"/>
+                </a:solidFill>
+                <a:latin typeface="Arial"/>
+                <a:ea typeface="+mn-lt"/>
+                <a:cs typeface="+mn-lt"/>
+              </a:rPr>
+              <a:t>Important Points:</a:t>
+            </a:r>
+            <a:endParaRPr lang="en-GB" sz="1600">
+              <a:solidFill>
+                <a:schemeClr val="bg1"/>
+              </a:solidFill>
+              <a:latin typeface="Arial"/>
+              <a:cs typeface="Arial"/>
+            </a:endParaRPr>
+          </a:p>
+          <a:p>
+            <a:pPr>
+              <a:buFont typeface="Arial"/>
+              <a:buChar char="•"/>
+            </a:pPr>
+            <a:r>
+              <a:rPr lang="en-GB" sz="1600" dirty="0">
+                <a:solidFill>
+                  <a:schemeClr val="bg1"/>
+                </a:solidFill>
+                <a:latin typeface="Arial"/>
+                <a:ea typeface="+mn-lt"/>
+                <a:cs typeface="+mn-lt"/>
+              </a:rPr>
+              <a:t>Learning curve for newcomers.</a:t>
+            </a:r>
+            <a:endParaRPr lang="en-GB" sz="1600">
+              <a:solidFill>
+                <a:schemeClr val="bg1"/>
+              </a:solidFill>
+              <a:latin typeface="Arial"/>
+              <a:cs typeface="Arial"/>
+            </a:endParaRPr>
+          </a:p>
+          <a:p>
+            <a:pPr>
+              <a:buFont typeface="Arial"/>
+              <a:buChar char="•"/>
+            </a:pPr>
+            <a:r>
+              <a:rPr lang="en-GB" sz="1600" dirty="0">
+                <a:solidFill>
+                  <a:schemeClr val="bg1"/>
+                </a:solidFill>
+                <a:latin typeface="Arial"/>
+                <a:ea typeface="+mn-lt"/>
+                <a:cs typeface="+mn-lt"/>
+              </a:rPr>
+              <a:t>No direct HTML comments; use </a:t>
+            </a:r>
+            <a:r>
+              <a:rPr lang="en-GB" sz="1600" b="1" dirty="0">
+                <a:solidFill>
+                  <a:schemeClr val="bg1"/>
+                </a:solidFill>
+                <a:latin typeface="Arial"/>
+                <a:ea typeface="+mn-lt"/>
+                <a:cs typeface="+mn-lt"/>
+              </a:rPr>
+              <a:t>{/* ... */}</a:t>
+            </a:r>
+            <a:r>
+              <a:rPr lang="en-GB" sz="1600" dirty="0">
+                <a:solidFill>
+                  <a:schemeClr val="bg1"/>
+                </a:solidFill>
+                <a:latin typeface="Arial"/>
+                <a:ea typeface="+mn-lt"/>
+                <a:cs typeface="+mn-lt"/>
+              </a:rPr>
+              <a:t>.</a:t>
+            </a:r>
+            <a:endParaRPr lang="en-GB" sz="1600">
+              <a:solidFill>
+                <a:schemeClr val="bg1"/>
+              </a:solidFill>
+              <a:latin typeface="Arial"/>
+              <a:cs typeface="Arial"/>
+            </a:endParaRPr>
+          </a:p>
+          <a:p>
+            <a:pPr>
+              <a:buFont typeface="Arial"/>
+              <a:buChar char="•"/>
+            </a:pPr>
+            <a:r>
+              <a:rPr lang="en-GB" sz="1600" dirty="0">
+                <a:solidFill>
+                  <a:schemeClr val="bg1"/>
+                </a:solidFill>
+                <a:latin typeface="Arial"/>
+                <a:ea typeface="+mn-lt"/>
+                <a:cs typeface="+mn-lt"/>
+              </a:rPr>
+              <a:t>Self-closing tags should include a trailing slash.</a:t>
+            </a:r>
+            <a:endParaRPr lang="en-GB" sz="1600">
+              <a:solidFill>
+                <a:schemeClr val="bg1"/>
+              </a:solidFill>
+              <a:latin typeface="Arial"/>
+              <a:cs typeface="Arial"/>
+            </a:endParaRPr>
+          </a:p>
+          <a:p>
+            <a:pPr>
+              <a:buFont typeface="Arial"/>
+              <a:buChar char="•"/>
+            </a:pPr>
+            <a:r>
+              <a:rPr lang="en-GB" sz="1600" dirty="0">
+                <a:solidFill>
+                  <a:schemeClr val="bg1"/>
+                </a:solidFill>
+                <a:latin typeface="Arial"/>
+                <a:ea typeface="+mn-lt"/>
+                <a:cs typeface="+mn-lt"/>
+              </a:rPr>
+              <a:t>Use </a:t>
+            </a:r>
+            <a:r>
+              <a:rPr lang="en-GB" sz="1600" b="1" dirty="0" err="1">
+                <a:solidFill>
+                  <a:schemeClr val="bg1"/>
+                </a:solidFill>
+                <a:latin typeface="Arial"/>
+                <a:ea typeface="+mn-lt"/>
+                <a:cs typeface="+mn-lt"/>
+              </a:rPr>
+              <a:t>className</a:t>
+            </a:r>
+            <a:r>
+              <a:rPr lang="en-GB" sz="1600" dirty="0">
+                <a:solidFill>
+                  <a:schemeClr val="bg1"/>
+                </a:solidFill>
+                <a:latin typeface="Arial"/>
+                <a:ea typeface="+mn-lt"/>
+                <a:cs typeface="+mn-lt"/>
+              </a:rPr>
+              <a:t> for CSS classes.</a:t>
+            </a:r>
+            <a:endParaRPr lang="en-GB" sz="1600">
+              <a:solidFill>
+                <a:schemeClr val="bg1"/>
+              </a:solidFill>
+              <a:latin typeface="Arial"/>
+              <a:cs typeface="Arial"/>
+            </a:endParaRPr>
+          </a:p>
+          <a:p>
+            <a:pPr>
+              <a:buFont typeface="Arial"/>
+              <a:buChar char="•"/>
+            </a:pPr>
+            <a:r>
+              <a:rPr lang="en-GB" sz="1600" dirty="0">
+                <a:solidFill>
+                  <a:schemeClr val="bg1"/>
+                </a:solidFill>
+                <a:latin typeface="Arial"/>
+                <a:ea typeface="+mn-lt"/>
+                <a:cs typeface="+mn-lt"/>
+              </a:rPr>
+              <a:t>Wrapping elements in parentheses when multiple elements are returned.</a:t>
+            </a:r>
+            <a:endParaRPr lang="en-GB" sz="1600">
+              <a:solidFill>
+                <a:schemeClr val="bg1"/>
+              </a:solidFill>
+              <a:latin typeface="Arial"/>
+              <a:cs typeface="Arial"/>
+            </a:endParaRPr>
+          </a:p>
+          <a:p>
+            <a:pPr>
+              <a:buFont typeface="Arial"/>
+              <a:buChar char="•"/>
+            </a:pPr>
+            <a:r>
+              <a:rPr lang="en-GB" sz="1600" dirty="0">
+                <a:solidFill>
+                  <a:schemeClr val="bg1"/>
+                </a:solidFill>
+                <a:latin typeface="Arial"/>
+                <a:ea typeface="+mn-lt"/>
+                <a:cs typeface="+mn-lt"/>
+              </a:rPr>
+              <a:t>Potential naming conflicts with reserved words (e.g., </a:t>
+            </a:r>
+            <a:r>
+              <a:rPr lang="en-GB" sz="1600" b="1" dirty="0">
+                <a:solidFill>
+                  <a:schemeClr val="bg1"/>
+                </a:solidFill>
+                <a:latin typeface="Arial"/>
+                <a:ea typeface="+mn-lt"/>
+                <a:cs typeface="+mn-lt"/>
+              </a:rPr>
+              <a:t>class</a:t>
+            </a:r>
+            <a:r>
+              <a:rPr lang="en-GB" sz="1600" dirty="0">
+                <a:solidFill>
+                  <a:schemeClr val="bg1"/>
+                </a:solidFill>
+                <a:latin typeface="Arial"/>
+                <a:ea typeface="+mn-lt"/>
+                <a:cs typeface="+mn-lt"/>
+              </a:rPr>
+              <a:t> vs. </a:t>
+            </a:r>
+            <a:r>
+              <a:rPr lang="en-GB" sz="1600" b="1" dirty="0" err="1">
+                <a:solidFill>
+                  <a:schemeClr val="bg1"/>
+                </a:solidFill>
+                <a:latin typeface="Arial"/>
+                <a:ea typeface="+mn-lt"/>
+                <a:cs typeface="+mn-lt"/>
+              </a:rPr>
+              <a:t>className</a:t>
+            </a:r>
+            <a:r>
+              <a:rPr lang="en-GB" sz="1600" dirty="0">
+                <a:solidFill>
+                  <a:schemeClr val="bg1"/>
+                </a:solidFill>
+                <a:latin typeface="Arial"/>
+                <a:ea typeface="+mn-lt"/>
+                <a:cs typeface="+mn-lt"/>
+              </a:rPr>
+              <a:t>).</a:t>
+            </a:r>
+            <a:endParaRPr lang="en-GB" sz="1600">
+              <a:solidFill>
+                <a:schemeClr val="bg1"/>
+              </a:solidFill>
+              <a:latin typeface="Arial"/>
+              <a:cs typeface="Arial"/>
+            </a:endParaRPr>
+          </a:p>
+          <a:p>
+            <a:pPr>
+              <a:buFont typeface="Arial"/>
+              <a:buChar char="•"/>
+            </a:pPr>
+            <a:r>
+              <a:rPr lang="en-GB" sz="1600" dirty="0">
+                <a:solidFill>
+                  <a:schemeClr val="bg1"/>
+                </a:solidFill>
+                <a:latin typeface="Arial"/>
+                <a:ea typeface="+mn-lt"/>
+                <a:cs typeface="+mn-lt"/>
+              </a:rPr>
+              <a:t>Not enforcing accessibility; developers need to ensure accessibility manually.</a:t>
+            </a:r>
+            <a:endParaRPr lang="en-GB" sz="1600">
+              <a:solidFill>
+                <a:schemeClr val="bg1"/>
+              </a:solidFill>
+              <a:latin typeface="Arial"/>
+              <a:cs typeface="Arial"/>
+            </a:endParaRPr>
+          </a:p>
+          <a:p>
+            <a:pPr>
+              <a:buFont typeface="Arial"/>
+              <a:buChar char="•"/>
+            </a:pPr>
+            <a:r>
+              <a:rPr lang="en-GB" sz="1600" dirty="0">
+                <a:solidFill>
+                  <a:schemeClr val="bg1"/>
+                </a:solidFill>
+                <a:latin typeface="Arial"/>
+                <a:ea typeface="+mn-lt"/>
+                <a:cs typeface="+mn-lt"/>
+              </a:rPr>
+              <a:t>JSX is primarily used with React for UI development.</a:t>
+            </a:r>
+            <a:endParaRPr lang="en-GB" sz="1600">
+              <a:solidFill>
+                <a:schemeClr val="bg1"/>
+              </a:solidFill>
+              <a:latin typeface="Arial"/>
+              <a:cs typeface="Arial"/>
+            </a:endParaRPr>
+          </a:p>
+          <a:p>
+            <a:pPr marL="0" indent="0">
+              <a:buNone/>
+            </a:pPr>
+            <a:endParaRPr lang="en-GB" sz="1600" dirty="0">
+              <a:solidFill>
+                <a:schemeClr val="bg1"/>
+              </a:solidFill>
+              <a:latin typeface="Arial"/>
+              <a:cs typeface="Calibri"/>
+            </a:endParaRPr>
+          </a:p>
+          <a:p>
+            <a:pPr>
+              <a:buNone/>
+            </a:pPr>
+            <a:endParaRPr lang="en-GB" sz="1600" dirty="0">
+              <a:solidFill>
+                <a:schemeClr val="bg1"/>
+              </a:solidFill>
+              <a:latin typeface="Arial"/>
+              <a:cs typeface="Calibri"/>
+            </a:endParaRPr>
+          </a:p>
+        </p:txBody>
+      </p:sp>
+      <p:pic>
+        <p:nvPicPr>
+          <p:cNvPr id="6" name="Picture 5" descr="A couple of yellow cartoon characters&#10;&#10;Description automatically generated">
+            <a:extLst>
+              <a:ext uri="{FF2B5EF4-FFF2-40B4-BE49-F238E27FC236}">
+                <a16:creationId xmlns:a16="http://schemas.microsoft.com/office/drawing/2014/main" id="{613F53E4-F588-E339-4238-FD6621D61BA8}"/>
+              </a:ext>
+            </a:extLst>
+          </p:cNvPr>
+          <p:cNvPicPr>
+            <a:picLocks noChangeAspect="1"/>
+          </p:cNvPicPr>
+          <p:nvPr/>
+        </p:nvPicPr>
+        <p:blipFill rotWithShape="1">
+          <a:blip r:embed="rId2"/>
+          <a:srcRect l="7001" r="2333" b="1"/>
+          <a:stretch/>
+        </p:blipFill>
+        <p:spPr>
+          <a:xfrm>
+            <a:off x="8781642" y="4627081"/>
+            <a:ext cx="3961592" cy="2230918"/>
+          </a:xfrm>
+          <a:prstGeom prst="rect">
+            <a:avLst/>
+          </a:prstGeom>
+        </p:spPr>
+      </p:pic>
+      <p:cxnSp>
+        <p:nvCxnSpPr>
+          <p:cNvPr id="76" name="Straight Connector 75">
+            <a:extLst>
+              <a:ext uri="{FF2B5EF4-FFF2-40B4-BE49-F238E27FC236}">
+                <a16:creationId xmlns:a16="http://schemas.microsoft.com/office/drawing/2014/main" id="{C727A21A-62F5-405C-B7A5-439FD3993289}"/>
+              </a:ext>
+              <a:ext uri="{C183D7F6-B498-43B3-948B-1728B52AA6E4}">
+                <adec:decorative xmlns:adec="http://schemas.microsoft.com/office/drawing/2017/decorative" val="1"/>
+              </a:ext>
+            </a:extLst>
+          </p:cNvPr>
+          <p:cNvCxnSpPr>
+            <a:cxnSpLocks noGrp="1" noRot="1" noChangeAspect="1" noMove="1" noResize="1" noEditPoints="1" noAdjustHandles="1" noChangeArrowheads="1" noChangeShapeType="1"/>
+          </p:cNvCxnSpPr>
+          <p:nvPr>
+            <p:extLst>
+              <p:ext uri="{386F3935-93C4-4BCD-93E2-E3B085C9AB24}">
+                <p16:designElem xmlns:p16="http://schemas.microsoft.com/office/powerpoint/2015/main" val="1"/>
+              </p:ext>
+            </p:extLst>
+          </p:nvPr>
+        </p:nvCxnSpPr>
+        <p:spPr>
+          <a:xfrm>
+            <a:off x="11829053" y="0"/>
+            <a:ext cx="0" cy="6858000"/>
+          </a:xfrm>
+          <a:prstGeom prst="line">
+            <a:avLst/>
+          </a:prstGeom>
+          <a:ln w="12700">
+            <a:solidFill>
+              <a:schemeClr val="accent2"/>
+            </a:solidFill>
+          </a:ln>
+        </p:spPr>
+        <p:style>
+          <a:lnRef idx="1">
+            <a:schemeClr val="accent1"/>
+          </a:lnRef>
+          <a:fillRef idx="0">
+            <a:schemeClr val="accent1"/>
+          </a:fillRef>
+          <a:effectRef idx="0">
+            <a:schemeClr val="accent1"/>
+          </a:effectRef>
+          <a:fontRef idx="minor">
+            <a:schemeClr val="tx1"/>
+          </a:fontRef>
+        </p:style>
+      </p:cxnSp>
+      <p:cxnSp>
+        <p:nvCxnSpPr>
+          <p:cNvPr id="77" name="Straight Connector 76">
+            <a:extLst>
+              <a:ext uri="{FF2B5EF4-FFF2-40B4-BE49-F238E27FC236}">
+                <a16:creationId xmlns:a16="http://schemas.microsoft.com/office/drawing/2014/main" id="{F641577A-888F-4E56-B9E4-CC57AC7B7BDB}"/>
+              </a:ext>
+              <a:ext uri="{C183D7F6-B498-43B3-948B-1728B52AA6E4}">
+                <adec:decorative xmlns:adec="http://schemas.microsoft.com/office/drawing/2017/decorative" val="1"/>
+              </a:ext>
+            </a:extLst>
+          </p:cNvPr>
+          <p:cNvCxnSpPr>
+            <a:cxnSpLocks noGrp="1" noRot="1" noChangeAspect="1" noMove="1" noResize="1" noEditPoints="1" noAdjustHandles="1" noChangeArrowheads="1" noChangeShapeType="1"/>
+          </p:cNvCxnSpPr>
+          <p:nvPr>
+            <p:extLst>
+              <p:ext uri="{386F3935-93C4-4BCD-93E2-E3B085C9AB24}">
+                <p16:designElem xmlns:p16="http://schemas.microsoft.com/office/powerpoint/2015/main" val="1"/>
+              </p:ext>
+            </p:extLst>
+          </p:nvPr>
+        </p:nvCxnSpPr>
+        <p:spPr>
+          <a:xfrm flipH="1">
+            <a:off x="1295399" y="2026340"/>
+            <a:ext cx="10896601" cy="0"/>
+          </a:xfrm>
+          <a:prstGeom prst="line">
+            <a:avLst/>
+          </a:prstGeom>
+          <a:ln w="12700">
+            <a:solidFill>
+              <a:schemeClr val="accent2"/>
+            </a:solidFill>
+          </a:ln>
+        </p:spPr>
+        <p:style>
+          <a:lnRef idx="1">
+            <a:schemeClr val="accent1"/>
+          </a:lnRef>
+          <a:fillRef idx="0">
+            <a:schemeClr val="accent1"/>
+          </a:fillRef>
+          <a:effectRef idx="0">
+            <a:schemeClr val="accent1"/>
+          </a:effectRef>
+          <a:fontRef idx="minor">
+            <a:schemeClr val="tx1"/>
+          </a:fontRef>
+        </p:style>
+      </p:cxnSp>
+    </p:spTree>
+    <p:extLst>
+      <p:ext uri="{BB962C8B-B14F-4D97-AF65-F5344CB8AC3E}">
+        <p14:creationId xmlns:p14="http://schemas.microsoft.com/office/powerpoint/2010/main" val="2053485375"/>
       </p:ext>
     </p:extLst>
   </p:cSld>

</xml_diff>